<commit_message>
Agrego PPT con resumen de edificio y hartos monos
</commit_message>
<xml_diff>
--- a/Presentación/Capiteles de Losa.pptx
+++ b/Presentación/Capiteles de Losa.pptx
@@ -314,7 +314,7 @@
           <a:p>
             <a:fld id="{397E0307-B85C-446A-8EF0-0407D435D787}" type="datetimeFigureOut">
               <a:rPr lang="en-US" smtClean="0"/>
-              <a:t>11/27/2018</a:t>
+              <a:t>12/28/2018</a:t>
             </a:fld>
             <a:endParaRPr lang="en-US" dirty="0"/>
           </a:p>
@@ -443,7 +443,7 @@
           <a:p>
             <a:fld id="{6D22F896-40B5-4ADD-8801-0D06FADFA095}" type="slidenum">
               <a:rPr lang="en-US" smtClean="0"/>
-              <a:t>‹Nº›</a:t>
+              <a:t>‹#›</a:t>
             </a:fld>
             <a:endParaRPr lang="en-US" dirty="0"/>
           </a:p>
@@ -652,7 +652,7 @@
           <a:p>
             <a:fld id="{30EF52CC-F3D9-41D4-BCE4-C208E61A3F31}" type="datetimeFigureOut">
               <a:rPr lang="en-US" smtClean="0"/>
-              <a:t>11/27/2018</a:t>
+              <a:t>12/28/2018</a:t>
             </a:fld>
             <a:endParaRPr lang="en-US" dirty="0"/>
           </a:p>
@@ -782,7 +782,7 @@
             <a:fld id="{6D22F896-40B5-4ADD-8801-0D06FADFA095}" type="slidenum">
               <a:rPr lang="en-US" smtClean="0"/>
               <a:pPr/>
-              <a:t>‹Nº›</a:t>
+              <a:t>‹#›</a:t>
             </a:fld>
             <a:endParaRPr lang="en-US" dirty="0"/>
           </a:p>
@@ -1055,7 +1055,7 @@
           <a:p>
             <a:fld id="{30EF52CC-F3D9-41D4-BCE4-C208E61A3F31}" type="datetimeFigureOut">
               <a:rPr lang="en-US" smtClean="0"/>
-              <a:t>11/27/2018</a:t>
+              <a:t>12/28/2018</a:t>
             </a:fld>
             <a:endParaRPr lang="en-US" dirty="0"/>
           </a:p>
@@ -1185,7 +1185,7 @@
             <a:fld id="{6D22F896-40B5-4ADD-8801-0D06FADFA095}" type="slidenum">
               <a:rPr lang="en-US" smtClean="0"/>
               <a:pPr/>
-              <a:t>‹Nº›</a:t>
+              <a:t>‹#›</a:t>
             </a:fld>
             <a:endParaRPr lang="en-US" dirty="0"/>
           </a:p>
@@ -1393,7 +1393,7 @@
           <a:p>
             <a:fld id="{30EF52CC-F3D9-41D4-BCE4-C208E61A3F31}" type="datetimeFigureOut">
               <a:rPr lang="en-US" smtClean="0"/>
-              <a:t>11/27/2018</a:t>
+              <a:t>12/28/2018</a:t>
             </a:fld>
             <a:endParaRPr lang="en-US" dirty="0"/>
           </a:p>
@@ -1523,7 +1523,7 @@
             <a:fld id="{6D22F896-40B5-4ADD-8801-0D06FADFA095}" type="slidenum">
               <a:rPr lang="en-US" smtClean="0"/>
               <a:pPr/>
-              <a:t>‹Nº›</a:t>
+              <a:t>‹#›</a:t>
             </a:fld>
             <a:endParaRPr lang="en-US" dirty="0"/>
           </a:p>
@@ -1715,7 +1715,7 @@
           <a:p>
             <a:fld id="{30EF52CC-F3D9-41D4-BCE4-C208E61A3F31}" type="datetimeFigureOut">
               <a:rPr lang="en-US" smtClean="0"/>
-              <a:t>11/27/2018</a:t>
+              <a:t>12/28/2018</a:t>
             </a:fld>
             <a:endParaRPr lang="en-US" dirty="0"/>
           </a:p>
@@ -1845,7 +1845,7 @@
             <a:fld id="{6D22F896-40B5-4ADD-8801-0D06FADFA095}" type="slidenum">
               <a:rPr lang="en-US" smtClean="0"/>
               <a:pPr/>
-              <a:t>‹Nº›</a:t>
+              <a:t>‹#›</a:t>
             </a:fld>
             <a:endParaRPr lang="en-US" dirty="0"/>
           </a:p>
@@ -2113,7 +2113,7 @@
           <a:p>
             <a:fld id="{30EF52CC-F3D9-41D4-BCE4-C208E61A3F31}" type="datetimeFigureOut">
               <a:rPr lang="en-US" smtClean="0"/>
-              <a:t>11/27/2018</a:t>
+              <a:t>12/28/2018</a:t>
             </a:fld>
             <a:endParaRPr lang="en-US" dirty="0"/>
           </a:p>
@@ -2243,7 +2243,7 @@
             <a:fld id="{6D22F896-40B5-4ADD-8801-0D06FADFA095}" type="slidenum">
               <a:rPr lang="en-US" smtClean="0"/>
               <a:pPr/>
-              <a:t>‹Nº›</a:t>
+              <a:t>‹#›</a:t>
             </a:fld>
             <a:endParaRPr lang="en-US" dirty="0"/>
           </a:p>
@@ -2372,7 +2372,7 @@
           <a:p>
             <a:fld id="{B3CFE2CC-454D-4466-AC55-B86DA0A87BAE}" type="datetimeFigureOut">
               <a:rPr lang="en-US" smtClean="0"/>
-              <a:t>11/27/2018</a:t>
+              <a:t>12/28/2018</a:t>
             </a:fld>
             <a:endParaRPr lang="en-US" dirty="0"/>
           </a:p>
@@ -2496,7 +2496,7 @@
           <a:p>
             <a:fld id="{6D22F896-40B5-4ADD-8801-0D06FADFA095}" type="slidenum">
               <a:rPr lang="en-US" smtClean="0"/>
-              <a:t>‹Nº›</a:t>
+              <a:t>‹#›</a:t>
             </a:fld>
             <a:endParaRPr lang="en-US" dirty="0"/>
           </a:p>
@@ -2634,7 +2634,7 @@
           <a:p>
             <a:fld id="{B647B1BF-4039-460D-A637-65428CBD720E}" type="datetimeFigureOut">
               <a:rPr lang="en-US" smtClean="0"/>
-              <a:t>11/27/2018</a:t>
+              <a:t>12/28/2018</a:t>
             </a:fld>
             <a:endParaRPr lang="en-US" dirty="0"/>
           </a:p>
@@ -2759,7 +2759,7 @@
             <a:fld id="{6D22F896-40B5-4ADD-8801-0D06FADFA095}" type="slidenum">
               <a:rPr lang="en-US" smtClean="0"/>
               <a:pPr/>
-              <a:t>‹Nº›</a:t>
+              <a:t>‹#›</a:t>
             </a:fld>
             <a:endParaRPr lang="en-US" dirty="0"/>
           </a:p>
@@ -2897,7 +2897,7 @@
           <a:p>
             <a:fld id="{AAA39ACE-9343-4EBE-B5CA-AEA240A1DC53}" type="datetimeFigureOut">
               <a:rPr lang="en-US" smtClean="0"/>
-              <a:t>11/27/2018</a:t>
+              <a:t>12/28/2018</a:t>
             </a:fld>
             <a:endParaRPr lang="en-US" dirty="0"/>
           </a:p>
@@ -3021,7 +3021,7 @@
           <a:p>
             <a:fld id="{6D22F896-40B5-4ADD-8801-0D06FADFA095}" type="slidenum">
               <a:rPr lang="en-US" smtClean="0"/>
-              <a:t>‹Nº›</a:t>
+              <a:t>‹#›</a:t>
             </a:fld>
             <a:endParaRPr lang="en-US" dirty="0"/>
           </a:p>
@@ -3226,7 +3226,7 @@
           <a:p>
             <a:fld id="{C9A00F7B-89C5-4DF7-A309-6263220147D4}" type="datetimeFigureOut">
               <a:rPr lang="en-US" smtClean="0"/>
-              <a:t>11/27/2018</a:t>
+              <a:t>12/28/2018</a:t>
             </a:fld>
             <a:endParaRPr lang="en-US" dirty="0"/>
           </a:p>
@@ -3355,7 +3355,7 @@
           <a:p>
             <a:fld id="{6D22F896-40B5-4ADD-8801-0D06FADFA095}" type="slidenum">
               <a:rPr lang="en-US" smtClean="0"/>
-              <a:t>‹Nº›</a:t>
+              <a:t>‹#›</a:t>
             </a:fld>
             <a:endParaRPr lang="en-US" dirty="0"/>
           </a:p>
@@ -3549,7 +3549,7 @@
           <a:p>
             <a:fld id="{449C95DE-FD64-4606-AE61-EC1136867CC6}" type="datetimeFigureOut">
               <a:rPr lang="en-US" smtClean="0"/>
-              <a:t>11/27/2018</a:t>
+              <a:t>12/28/2018</a:t>
             </a:fld>
             <a:endParaRPr lang="en-US" dirty="0"/>
           </a:p>
@@ -3678,7 +3678,7 @@
           <a:p>
             <a:fld id="{6D22F896-40B5-4ADD-8801-0D06FADFA095}" type="slidenum">
               <a:rPr lang="en-US" smtClean="0"/>
-              <a:t>‹Nº›</a:t>
+              <a:t>‹#›</a:t>
             </a:fld>
             <a:endParaRPr lang="en-US" dirty="0"/>
           </a:p>
@@ -4006,7 +4006,7 @@
           <a:p>
             <a:fld id="{5DEB0BBD-30FE-4CF1-900A-0C45149F8AF8}" type="datetimeFigureOut">
               <a:rPr lang="en-US" smtClean="0"/>
-              <a:t>11/27/2018</a:t>
+              <a:t>12/28/2018</a:t>
             </a:fld>
             <a:endParaRPr lang="en-US" dirty="0"/>
           </a:p>
@@ -4135,7 +4135,7 @@
           <a:p>
             <a:fld id="{6D22F896-40B5-4ADD-8801-0D06FADFA095}" type="slidenum">
               <a:rPr lang="en-US" smtClean="0"/>
-              <a:t>‹Nº›</a:t>
+              <a:t>‹#›</a:t>
             </a:fld>
             <a:endParaRPr lang="en-US" dirty="0"/>
           </a:p>
@@ -4211,7 +4211,7 @@
           <a:p>
             <a:fld id="{B91A5F7F-3E81-4C65-A4D1-CB62D5B9DB91}" type="datetimeFigureOut">
               <a:rPr lang="en-US" smtClean="0"/>
-              <a:t>11/27/2018</a:t>
+              <a:t>12/28/2018</a:t>
             </a:fld>
             <a:endParaRPr lang="en-US" dirty="0"/>
           </a:p>
@@ -4335,7 +4335,7 @@
           <a:p>
             <a:fld id="{6D22F896-40B5-4ADD-8801-0D06FADFA095}" type="slidenum">
               <a:rPr lang="en-US" smtClean="0"/>
-              <a:t>‹Nº›</a:t>
+              <a:t>‹#›</a:t>
             </a:fld>
             <a:endParaRPr lang="en-US" dirty="0"/>
           </a:p>
@@ -4388,7 +4388,7 @@
           <a:p>
             <a:fld id="{377ECC86-1672-4627-AEFE-EC5485C73905}" type="datetimeFigureOut">
               <a:rPr lang="en-US" smtClean="0"/>
-              <a:t>11/27/2018</a:t>
+              <a:t>12/28/2018</a:t>
             </a:fld>
             <a:endParaRPr lang="en-US" dirty="0"/>
           </a:p>
@@ -4512,7 +4512,7 @@
           <a:p>
             <a:fld id="{6D22F896-40B5-4ADD-8801-0D06FADFA095}" type="slidenum">
               <a:rPr lang="en-US" smtClean="0"/>
-              <a:t>‹Nº›</a:t>
+              <a:t>‹#›</a:t>
             </a:fld>
             <a:endParaRPr lang="en-US" dirty="0"/>
           </a:p>
@@ -4721,7 +4721,7 @@
           <a:p>
             <a:fld id="{3CDCB01F-D966-4C62-B900-0BE008A90C98}" type="datetimeFigureOut">
               <a:rPr lang="en-US" smtClean="0"/>
-              <a:t>11/27/2018</a:t>
+              <a:t>12/28/2018</a:t>
             </a:fld>
             <a:endParaRPr lang="en-US" dirty="0"/>
           </a:p>
@@ -4845,7 +4845,7 @@
           <a:p>
             <a:fld id="{6D22F896-40B5-4ADD-8801-0D06FADFA095}" type="slidenum">
               <a:rPr lang="en-US" smtClean="0"/>
-              <a:t>‹Nº›</a:t>
+              <a:t>‹#›</a:t>
             </a:fld>
             <a:endParaRPr lang="en-US" dirty="0"/>
           </a:p>
@@ -5066,7 +5066,7 @@
           <a:p>
             <a:fld id="{5E73A0EA-7DC7-4964-BB97-B173EF3B859A}" type="datetimeFigureOut">
               <a:rPr lang="en-US" smtClean="0"/>
-              <a:t>11/27/2018</a:t>
+              <a:t>12/28/2018</a:t>
             </a:fld>
             <a:endParaRPr lang="en-US" dirty="0"/>
           </a:p>
@@ -5195,7 +5195,7 @@
           <a:p>
             <a:fld id="{6D22F896-40B5-4ADD-8801-0D06FADFA095}" type="slidenum">
               <a:rPr lang="en-US" smtClean="0"/>
-              <a:t>‹Nº›</a:t>
+              <a:t>‹#›</a:t>
             </a:fld>
             <a:endParaRPr lang="en-US" dirty="0"/>
           </a:p>
@@ -7205,7 +7205,7 @@
           <a:p>
             <a:fld id="{30EF52CC-F3D9-41D4-BCE4-C208E61A3F31}" type="datetimeFigureOut">
               <a:rPr lang="en-US" smtClean="0"/>
-              <a:t>11/27/2018</a:t>
+              <a:t>12/28/2018</a:t>
             </a:fld>
             <a:endParaRPr lang="en-US" dirty="0"/>
           </a:p>
@@ -7282,7 +7282,7 @@
             <a:fld id="{6D22F896-40B5-4ADD-8801-0D06FADFA095}" type="slidenum">
               <a:rPr lang="en-US" smtClean="0"/>
               <a:pPr/>
-              <a:t>‹Nº›</a:t>
+              <a:t>‹#›</a:t>
             </a:fld>
             <a:endParaRPr lang="en-US" dirty="0"/>
           </a:p>
@@ -8736,19 +8736,6 @@
             </a:pPr>
             <a:r>
               <a:rPr lang="es-CL" dirty="0">
-                <a:hlinkClick r:id="rId2"/>
-              </a:rPr>
-              <a:t>https://www.slideshare.net/satishhn/civil-structural-engineering-flat-slab-design</a:t>
-            </a:r>
-            <a:endParaRPr lang="es-CL" dirty="0"/>
-          </a:p>
-          <a:p>
-            <a:pPr>
-              <a:buFont typeface="Arial" panose="020B0604020202020204" pitchFamily="34" charset="0"/>
-              <a:buChar char="•"/>
-            </a:pPr>
-            <a:r>
-              <a:rPr lang="es-CL" dirty="0">
                 <a:hlinkClick r:id="rId3"/>
               </a:rPr>
               <a:t>https://e-struc.com/2017/06/06/punzonamiento-diseno-estructural/</a:t>
@@ -10338,6 +10325,14 @@
           <a:p>
             <a:pPr algn="just"/>
             <a:r>
+              <a:rPr lang="es-CL" dirty="0"/>
+              <a:t>Cuando existe una cabeza de columna, la porción de columna </a:t>
+            </a:r>
+            <a:endParaRPr lang="en-US" dirty="0"/>
+          </a:p>
+          <a:p>
+            <a:pPr algn="just"/>
+            <a:r>
               <a:rPr lang="en-US" dirty="0"/>
               <a:t>Where column heads are provided, that portion of a column head which lies within the largest right circular cone or pyramid that has a vertex angle of 900and can be included entirely within the outlines of the column and the column head, shall be considered for design purposes.</a:t>
             </a:r>
@@ -10380,7 +10375,7 @@
         </p:blipFill>
         <p:spPr>
           <a:xfrm>
-            <a:off x="3606810" y="3325562"/>
+            <a:off x="3590185" y="3649758"/>
             <a:ext cx="5793864" cy="3135898"/>
           </a:xfrm>
           <a:prstGeom prst="rect">

</xml_diff>

<commit_message>
Complemento PPT de capiteles con usos en Chile y armaduar
</commit_message>
<xml_diff>
--- a/Presentación/Capiteles de Losa.pptx
+++ b/Presentación/Capiteles de Losa.pptx
@@ -19,7 +19,10 @@
     <p:sldId id="268" r:id="rId13"/>
     <p:sldId id="269" r:id="rId14"/>
     <p:sldId id="270" r:id="rId15"/>
-    <p:sldId id="264" r:id="rId16"/>
+    <p:sldId id="273" r:id="rId16"/>
+    <p:sldId id="274" r:id="rId17"/>
+    <p:sldId id="275" r:id="rId18"/>
+    <p:sldId id="264" r:id="rId19"/>
   </p:sldIdLst>
   <p:sldSz cx="12192000" cy="6858000"/>
   <p:notesSz cx="6858000" cy="9144000"/>
@@ -8661,6 +8664,368 @@
       </p:grpSpPr>
       <p:sp>
         <p:nvSpPr>
+          <p:cNvPr id="2" name="Title 1">
+            <a:extLst>
+              <a:ext uri="{FF2B5EF4-FFF2-40B4-BE49-F238E27FC236}">
+                <a16:creationId xmlns:a16="http://schemas.microsoft.com/office/drawing/2014/main" id="{00355B56-3C87-4D17-8657-3CA4756C7897}"/>
+              </a:ext>
+            </a:extLst>
+          </p:cNvPr>
+          <p:cNvSpPr>
+            <a:spLocks noGrp="1"/>
+          </p:cNvSpPr>
+          <p:nvPr>
+            <p:ph type="title"/>
+          </p:nvPr>
+        </p:nvSpPr>
+        <p:spPr/>
+        <p:txBody>
+          <a:bodyPr/>
+          <a:lstStyle/>
+          <a:p>
+            <a:r>
+              <a:rPr lang="es-CL" dirty="0"/>
+              <a:t>Uso en Chile</a:t>
+            </a:r>
+            <a:endParaRPr lang="en-US" dirty="0"/>
+          </a:p>
+        </p:txBody>
+      </p:sp>
+      <p:pic>
+        <p:nvPicPr>
+          <p:cNvPr id="1026" name="Picture 2" descr="Resultado de imagen para estacionamiento mall en chile">
+            <a:extLst>
+              <a:ext uri="{FF2B5EF4-FFF2-40B4-BE49-F238E27FC236}">
+                <a16:creationId xmlns:a16="http://schemas.microsoft.com/office/drawing/2014/main" id="{AE57A1FD-7F93-4B9D-AFDA-CACFEE950A44}"/>
+              </a:ext>
+            </a:extLst>
+          </p:cNvPr>
+          <p:cNvPicPr>
+            <a:picLocks noGrp="1" noChangeAspect="1" noChangeArrowheads="1"/>
+          </p:cNvPicPr>
+          <p:nvPr>
+            <p:ph idx="1"/>
+          </p:nvPr>
+        </p:nvPicPr>
+        <p:blipFill>
+          <a:blip r:embed="rId2">
+            <a:extLst>
+              <a:ext uri="{28A0092B-C50C-407E-A947-70E740481C1C}">
+                <a14:useLocalDpi xmlns:a14="http://schemas.microsoft.com/office/drawing/2010/main" val="0"/>
+              </a:ext>
+            </a:extLst>
+          </a:blip>
+          <a:srcRect/>
+          <a:stretch>
+            <a:fillRect/>
+          </a:stretch>
+        </p:blipFill>
+        <p:spPr bwMode="auto">
+          <a:xfrm>
+            <a:off x="2649768" y="1661890"/>
+            <a:ext cx="6892463" cy="4572000"/>
+          </a:xfrm>
+          <a:prstGeom prst="rect">
+            <a:avLst/>
+          </a:prstGeom>
+          <a:noFill/>
+          <a:extLst>
+            <a:ext uri="{909E8E84-426E-40DD-AFC4-6F175D3DCCD1}">
+              <a14:hiddenFill xmlns:a14="http://schemas.microsoft.com/office/drawing/2010/main">
+                <a:solidFill>
+                  <a:srgbClr val="FFFFFF"/>
+                </a:solidFill>
+              </a14:hiddenFill>
+            </a:ext>
+          </a:extLst>
+        </p:spPr>
+      </p:pic>
+    </p:spTree>
+    <p:extLst>
+      <p:ext uri="{BB962C8B-B14F-4D97-AF65-F5344CB8AC3E}">
+        <p14:creationId xmlns:p14="http://schemas.microsoft.com/office/powerpoint/2010/main" val="3385040031"/>
+      </p:ext>
+    </p:extLst>
+  </p:cSld>
+  <p:clrMapOvr>
+    <a:masterClrMapping/>
+  </p:clrMapOvr>
+</p:sld>
+</file>
+
+<file path=ppt/slides/slide16.xml><?xml version="1.0" encoding="utf-8"?>
+<p:sld xmlns:a="http://schemas.openxmlformats.org/drawingml/2006/main" xmlns:r="http://schemas.openxmlformats.org/officeDocument/2006/relationships" xmlns:p="http://schemas.openxmlformats.org/presentationml/2006/main">
+  <p:cSld>
+    <p:spTree>
+      <p:nvGrpSpPr>
+        <p:cNvPr id="1" name=""/>
+        <p:cNvGrpSpPr/>
+        <p:nvPr/>
+      </p:nvGrpSpPr>
+      <p:grpSpPr>
+        <a:xfrm>
+          <a:off x="0" y="0"/>
+          <a:ext cx="0" cy="0"/>
+          <a:chOff x="0" y="0"/>
+          <a:chExt cx="0" cy="0"/>
+        </a:xfrm>
+      </p:grpSpPr>
+      <p:sp>
+        <p:nvSpPr>
+          <p:cNvPr id="2" name="Title 1">
+            <a:extLst>
+              <a:ext uri="{FF2B5EF4-FFF2-40B4-BE49-F238E27FC236}">
+                <a16:creationId xmlns:a16="http://schemas.microsoft.com/office/drawing/2014/main" id="{E00AD800-FC51-4A4F-8DDB-93D734DE6E2B}"/>
+              </a:ext>
+            </a:extLst>
+          </p:cNvPr>
+          <p:cNvSpPr>
+            <a:spLocks noGrp="1"/>
+          </p:cNvSpPr>
+          <p:nvPr>
+            <p:ph type="title"/>
+          </p:nvPr>
+        </p:nvSpPr>
+        <p:spPr/>
+        <p:txBody>
+          <a:bodyPr/>
+          <a:lstStyle/>
+          <a:p>
+            <a:endParaRPr lang="en-US"/>
+          </a:p>
+        </p:txBody>
+      </p:sp>
+      <p:sp>
+        <p:nvSpPr>
+          <p:cNvPr id="3" name="Content Placeholder 2">
+            <a:extLst>
+              <a:ext uri="{FF2B5EF4-FFF2-40B4-BE49-F238E27FC236}">
+                <a16:creationId xmlns:a16="http://schemas.microsoft.com/office/drawing/2014/main" id="{128C7DE3-EBF9-49A4-9B5B-A145DD1C826E}"/>
+              </a:ext>
+            </a:extLst>
+          </p:cNvPr>
+          <p:cNvSpPr>
+            <a:spLocks noGrp="1"/>
+          </p:cNvSpPr>
+          <p:nvPr>
+            <p:ph idx="1"/>
+          </p:nvPr>
+        </p:nvSpPr>
+        <p:spPr/>
+        <p:txBody>
+          <a:bodyPr/>
+          <a:lstStyle/>
+          <a:p>
+            <a:endParaRPr lang="en-US"/>
+          </a:p>
+        </p:txBody>
+      </p:sp>
+      <p:pic>
+        <p:nvPicPr>
+          <p:cNvPr id="2050" name="Picture 2" descr="Imagen relacionada">
+            <a:extLst>
+              <a:ext uri="{FF2B5EF4-FFF2-40B4-BE49-F238E27FC236}">
+                <a16:creationId xmlns:a16="http://schemas.microsoft.com/office/drawing/2014/main" id="{01E75AB4-532B-44E3-B4D1-0C9F96FC0CFE}"/>
+              </a:ext>
+            </a:extLst>
+          </p:cNvPr>
+          <p:cNvPicPr>
+            <a:picLocks noChangeAspect="1" noChangeArrowheads="1"/>
+          </p:cNvPicPr>
+          <p:nvPr/>
+        </p:nvPicPr>
+        <p:blipFill>
+          <a:blip r:embed="rId2">
+            <a:extLst>
+              <a:ext uri="{28A0092B-C50C-407E-A947-70E740481C1C}">
+                <a14:useLocalDpi xmlns:a14="http://schemas.microsoft.com/office/drawing/2010/main" val="0"/>
+              </a:ext>
+            </a:extLst>
+          </a:blip>
+          <a:srcRect/>
+          <a:stretch>
+            <a:fillRect/>
+          </a:stretch>
+        </p:blipFill>
+        <p:spPr bwMode="auto">
+          <a:xfrm>
+            <a:off x="1915886" y="685800"/>
+            <a:ext cx="8360229" cy="5486400"/>
+          </a:xfrm>
+          <a:prstGeom prst="rect">
+            <a:avLst/>
+          </a:prstGeom>
+          <a:noFill/>
+          <a:extLst>
+            <a:ext uri="{909E8E84-426E-40DD-AFC4-6F175D3DCCD1}">
+              <a14:hiddenFill xmlns:a14="http://schemas.microsoft.com/office/drawing/2010/main">
+                <a:solidFill>
+                  <a:srgbClr val="FFFFFF"/>
+                </a:solidFill>
+              </a14:hiddenFill>
+            </a:ext>
+          </a:extLst>
+        </p:spPr>
+      </p:pic>
+    </p:spTree>
+    <p:extLst>
+      <p:ext uri="{BB962C8B-B14F-4D97-AF65-F5344CB8AC3E}">
+        <p14:creationId xmlns:p14="http://schemas.microsoft.com/office/powerpoint/2010/main" val="3738772852"/>
+      </p:ext>
+    </p:extLst>
+  </p:cSld>
+  <p:clrMapOvr>
+    <a:masterClrMapping/>
+  </p:clrMapOvr>
+</p:sld>
+</file>
+
+<file path=ppt/slides/slide17.xml><?xml version="1.0" encoding="utf-8"?>
+<p:sld xmlns:a="http://schemas.openxmlformats.org/drawingml/2006/main" xmlns:r="http://schemas.openxmlformats.org/officeDocument/2006/relationships" xmlns:p="http://schemas.openxmlformats.org/presentationml/2006/main">
+  <p:cSld>
+    <p:spTree>
+      <p:nvGrpSpPr>
+        <p:cNvPr id="1" name=""/>
+        <p:cNvGrpSpPr/>
+        <p:nvPr/>
+      </p:nvGrpSpPr>
+      <p:grpSpPr>
+        <a:xfrm>
+          <a:off x="0" y="0"/>
+          <a:ext cx="0" cy="0"/>
+          <a:chOff x="0" y="0"/>
+          <a:chExt cx="0" cy="0"/>
+        </a:xfrm>
+      </p:grpSpPr>
+      <p:sp>
+        <p:nvSpPr>
+          <p:cNvPr id="2" name="Title 1">
+            <a:extLst>
+              <a:ext uri="{FF2B5EF4-FFF2-40B4-BE49-F238E27FC236}">
+                <a16:creationId xmlns:a16="http://schemas.microsoft.com/office/drawing/2014/main" id="{3AAFC6B3-CA13-44C6-A8E3-A1D9A3343095}"/>
+              </a:ext>
+            </a:extLst>
+          </p:cNvPr>
+          <p:cNvSpPr>
+            <a:spLocks noGrp="1"/>
+          </p:cNvSpPr>
+          <p:nvPr>
+            <p:ph type="title"/>
+          </p:nvPr>
+        </p:nvSpPr>
+        <p:spPr/>
+        <p:txBody>
+          <a:bodyPr/>
+          <a:lstStyle/>
+          <a:p>
+            <a:endParaRPr lang="en-US"/>
+          </a:p>
+        </p:txBody>
+      </p:sp>
+      <p:sp>
+        <p:nvSpPr>
+          <p:cNvPr id="3" name="Content Placeholder 2">
+            <a:extLst>
+              <a:ext uri="{FF2B5EF4-FFF2-40B4-BE49-F238E27FC236}">
+                <a16:creationId xmlns:a16="http://schemas.microsoft.com/office/drawing/2014/main" id="{E93EC630-1776-4A97-8219-2E12382F3EFE}"/>
+              </a:ext>
+            </a:extLst>
+          </p:cNvPr>
+          <p:cNvSpPr>
+            <a:spLocks noGrp="1"/>
+          </p:cNvSpPr>
+          <p:nvPr>
+            <p:ph idx="1"/>
+          </p:nvPr>
+        </p:nvSpPr>
+        <p:spPr/>
+        <p:txBody>
+          <a:bodyPr/>
+          <a:lstStyle/>
+          <a:p>
+            <a:endParaRPr lang="en-US"/>
+          </a:p>
+        </p:txBody>
+      </p:sp>
+      <p:pic>
+        <p:nvPicPr>
+          <p:cNvPr id="3074" name="Picture 2" descr="Resultado de imagen para estacionamiento mall en chile">
+            <a:extLst>
+              <a:ext uri="{FF2B5EF4-FFF2-40B4-BE49-F238E27FC236}">
+                <a16:creationId xmlns:a16="http://schemas.microsoft.com/office/drawing/2014/main" id="{4779C9DD-B324-4D96-B734-21194DDECB20}"/>
+              </a:ext>
+            </a:extLst>
+          </p:cNvPr>
+          <p:cNvPicPr>
+            <a:picLocks noChangeAspect="1" noChangeArrowheads="1"/>
+          </p:cNvPicPr>
+          <p:nvPr/>
+        </p:nvPicPr>
+        <p:blipFill>
+          <a:blip r:embed="rId2">
+            <a:extLst>
+              <a:ext uri="{28A0092B-C50C-407E-A947-70E740481C1C}">
+                <a14:useLocalDpi xmlns:a14="http://schemas.microsoft.com/office/drawing/2010/main" val="0"/>
+              </a:ext>
+            </a:extLst>
+          </a:blip>
+          <a:srcRect/>
+          <a:stretch>
+            <a:fillRect/>
+          </a:stretch>
+        </p:blipFill>
+        <p:spPr bwMode="auto">
+          <a:xfrm>
+            <a:off x="2353340" y="685800"/>
+            <a:ext cx="7485321" cy="5486400"/>
+          </a:xfrm>
+          <a:prstGeom prst="rect">
+            <a:avLst/>
+          </a:prstGeom>
+          <a:noFill/>
+          <a:extLst>
+            <a:ext uri="{909E8E84-426E-40DD-AFC4-6F175D3DCCD1}">
+              <a14:hiddenFill xmlns:a14="http://schemas.microsoft.com/office/drawing/2010/main">
+                <a:solidFill>
+                  <a:srgbClr val="FFFFFF"/>
+                </a:solidFill>
+              </a14:hiddenFill>
+            </a:ext>
+          </a:extLst>
+        </p:spPr>
+      </p:pic>
+    </p:spTree>
+    <p:extLst>
+      <p:ext uri="{BB962C8B-B14F-4D97-AF65-F5344CB8AC3E}">
+        <p14:creationId xmlns:p14="http://schemas.microsoft.com/office/powerpoint/2010/main" val="3067482139"/>
+      </p:ext>
+    </p:extLst>
+  </p:cSld>
+  <p:clrMapOvr>
+    <a:masterClrMapping/>
+  </p:clrMapOvr>
+</p:sld>
+</file>
+
+<file path=ppt/slides/slide18.xml><?xml version="1.0" encoding="utf-8"?>
+<p:sld xmlns:a="http://schemas.openxmlformats.org/drawingml/2006/main" xmlns:r="http://schemas.openxmlformats.org/officeDocument/2006/relationships" xmlns:p="http://schemas.openxmlformats.org/presentationml/2006/main">
+  <p:cSld>
+    <p:spTree>
+      <p:nvGrpSpPr>
+        <p:cNvPr id="1" name=""/>
+        <p:cNvGrpSpPr/>
+        <p:nvPr/>
+      </p:nvGrpSpPr>
+      <p:grpSpPr>
+        <a:xfrm>
+          <a:off x="0" y="0"/>
+          <a:ext cx="0" cy="0"/>
+          <a:chOff x="0" y="0"/>
+          <a:chExt cx="0" cy="0"/>
+        </a:xfrm>
+      </p:grpSpPr>
+      <p:sp>
+        <p:nvSpPr>
           <p:cNvPr id="2" name="Título 1">
             <a:extLst>
               <a:ext uri="{FF2B5EF4-FFF2-40B4-BE49-F238E27FC236}">
@@ -10324,63 +10689,106 @@
           </a:p>
           <a:p>
             <a:pPr algn="just"/>
-            <a:r>
-              <a:rPr lang="es-CL" dirty="0"/>
-              <a:t>Cuando existe una cabeza de columna, la porción de columna </a:t>
-            </a:r>
-            <a:endParaRPr lang="en-US" dirty="0"/>
-          </a:p>
-          <a:p>
-            <a:pPr algn="just"/>
-            <a:r>
-              <a:rPr lang="en-US" dirty="0"/>
-              <a:t>Where column heads are provided, that portion of a column head which lies within the largest right circular cone or pyramid that has a vertex angle of 900and can be included entirely within the outlines of the column and the column head, shall be considered for design purposes.</a:t>
-            </a:r>
-          </a:p>
-          <a:p>
-            <a:pPr marL="0" indent="0" algn="just">
-              <a:buNone/>
-            </a:pPr>
             <a:endParaRPr lang="es-CL" dirty="0"/>
           </a:p>
           <a:p>
             <a:pPr algn="just"/>
             <a:endParaRPr lang="es-CL" dirty="0"/>
           </a:p>
-          <a:p>
-            <a:pPr algn="just"/>
-            <a:endParaRPr lang="es-CL" dirty="0"/>
-          </a:p>
         </p:txBody>
       </p:sp>
       <p:pic>
         <p:nvPicPr>
-          <p:cNvPr id="6" name="Imagen 5">
+          <p:cNvPr id="4098" name="Picture 2" descr="Resultado de imagen para capitel armadura">
             <a:extLst>
               <a:ext uri="{FF2B5EF4-FFF2-40B4-BE49-F238E27FC236}">
-                <a16:creationId xmlns:a16="http://schemas.microsoft.com/office/drawing/2014/main" id="{C7E64251-CFFB-477D-AD3A-42E74A57F0A4}"/>
+                <a16:creationId xmlns:a16="http://schemas.microsoft.com/office/drawing/2014/main" id="{272DE424-3BEB-49A9-B99E-B9C2CF4D382E}"/>
               </a:ext>
             </a:extLst>
           </p:cNvPr>
           <p:cNvPicPr>
-            <a:picLocks noChangeAspect="1"/>
+            <a:picLocks noChangeAspect="1" noChangeArrowheads="1"/>
           </p:cNvPicPr>
           <p:nvPr/>
         </p:nvPicPr>
         <p:blipFill>
-          <a:blip r:embed="rId2"/>
+          <a:blip r:embed="rId2">
+            <a:extLst>
+              <a:ext uri="{28A0092B-C50C-407E-A947-70E740481C1C}">
+                <a14:useLocalDpi xmlns:a14="http://schemas.microsoft.com/office/drawing/2010/main" val="0"/>
+              </a:ext>
+            </a:extLst>
+          </a:blip>
+          <a:srcRect/>
           <a:stretch>
             <a:fillRect/>
           </a:stretch>
         </p:blipFill>
-        <p:spPr>
+        <p:spPr bwMode="auto">
           <a:xfrm>
-            <a:off x="3590185" y="3649758"/>
-            <a:ext cx="5793864" cy="3135898"/>
+            <a:off x="801544" y="2085975"/>
+            <a:ext cx="4876800" cy="3657600"/>
           </a:xfrm>
           <a:prstGeom prst="rect">
             <a:avLst/>
           </a:prstGeom>
+          <a:noFill/>
+          <a:extLst>
+            <a:ext uri="{909E8E84-426E-40DD-AFC4-6F175D3DCCD1}">
+              <a14:hiddenFill xmlns:a14="http://schemas.microsoft.com/office/drawing/2010/main">
+                <a:solidFill>
+                  <a:srgbClr val="FFFFFF"/>
+                </a:solidFill>
+              </a14:hiddenFill>
+            </a:ext>
+          </a:extLst>
+        </p:spPr>
+      </p:pic>
+      <p:pic>
+        <p:nvPicPr>
+          <p:cNvPr id="4102" name="Picture 6" descr="Resultado de imagen para capitel armadura">
+            <a:extLst>
+              <a:ext uri="{FF2B5EF4-FFF2-40B4-BE49-F238E27FC236}">
+                <a16:creationId xmlns:a16="http://schemas.microsoft.com/office/drawing/2014/main" id="{905EE46A-4E1D-4C84-81DA-54F52FDF9AAB}"/>
+              </a:ext>
+            </a:extLst>
+          </p:cNvPr>
+          <p:cNvPicPr>
+            <a:picLocks noChangeAspect="1" noChangeArrowheads="1"/>
+          </p:cNvPicPr>
+          <p:nvPr/>
+        </p:nvPicPr>
+        <p:blipFill>
+          <a:blip r:embed="rId3">
+            <a:extLst>
+              <a:ext uri="{28A0092B-C50C-407E-A947-70E740481C1C}">
+                <a14:useLocalDpi xmlns:a14="http://schemas.microsoft.com/office/drawing/2010/main" val="0"/>
+              </a:ext>
+            </a:extLst>
+          </a:blip>
+          <a:srcRect/>
+          <a:stretch>
+            <a:fillRect/>
+          </a:stretch>
+        </p:blipFill>
+        <p:spPr bwMode="auto">
+          <a:xfrm>
+            <a:off x="5940592" y="2543175"/>
+            <a:ext cx="5995851" cy="2743200"/>
+          </a:xfrm>
+          <a:prstGeom prst="rect">
+            <a:avLst/>
+          </a:prstGeom>
+          <a:noFill/>
+          <a:extLst>
+            <a:ext uri="{909E8E84-426E-40DD-AFC4-6F175D3DCCD1}">
+              <a14:hiddenFill xmlns:a14="http://schemas.microsoft.com/office/drawing/2010/main">
+                <a:solidFill>
+                  <a:srgbClr val="FFFFFF"/>
+                </a:solidFill>
+              </a14:hiddenFill>
+            </a:ext>
+          </a:extLst>
         </p:spPr>
       </p:pic>
     </p:spTree>

</xml_diff>

<commit_message>
Cambié el orden de unas diapos
</commit_message>
<xml_diff>
--- a/Presentación/Capiteles de Losa.pptx
+++ b/Presentación/Capiteles de Losa.pptx
@@ -19,9 +19,9 @@
     <p:sldId id="268" r:id="rId13"/>
     <p:sldId id="269" r:id="rId14"/>
     <p:sldId id="270" r:id="rId15"/>
-    <p:sldId id="273" r:id="rId16"/>
+    <p:sldId id="275" r:id="rId16"/>
     <p:sldId id="274" r:id="rId17"/>
-    <p:sldId id="275" r:id="rId18"/>
+    <p:sldId id="273" r:id="rId18"/>
     <p:sldId id="264" r:id="rId19"/>
   </p:sldIdLst>
   <p:sldSz cx="12192000" cy="6858000"/>
@@ -317,7 +317,7 @@
           <a:p>
             <a:fld id="{397E0307-B85C-446A-8EF0-0407D435D787}" type="datetimeFigureOut">
               <a:rPr lang="en-US" smtClean="0"/>
-              <a:t>12/28/2018</a:t>
+              <a:t>12/29/2018</a:t>
             </a:fld>
             <a:endParaRPr lang="en-US" dirty="0"/>
           </a:p>
@@ -655,7 +655,7 @@
           <a:p>
             <a:fld id="{30EF52CC-F3D9-41D4-BCE4-C208E61A3F31}" type="datetimeFigureOut">
               <a:rPr lang="en-US" smtClean="0"/>
-              <a:t>12/28/2018</a:t>
+              <a:t>12/29/2018</a:t>
             </a:fld>
             <a:endParaRPr lang="en-US" dirty="0"/>
           </a:p>
@@ -1058,7 +1058,7 @@
           <a:p>
             <a:fld id="{30EF52CC-F3D9-41D4-BCE4-C208E61A3F31}" type="datetimeFigureOut">
               <a:rPr lang="en-US" smtClean="0"/>
-              <a:t>12/28/2018</a:t>
+              <a:t>12/29/2018</a:t>
             </a:fld>
             <a:endParaRPr lang="en-US" dirty="0"/>
           </a:p>
@@ -1396,7 +1396,7 @@
           <a:p>
             <a:fld id="{30EF52CC-F3D9-41D4-BCE4-C208E61A3F31}" type="datetimeFigureOut">
               <a:rPr lang="en-US" smtClean="0"/>
-              <a:t>12/28/2018</a:t>
+              <a:t>12/29/2018</a:t>
             </a:fld>
             <a:endParaRPr lang="en-US" dirty="0"/>
           </a:p>
@@ -1718,7 +1718,7 @@
           <a:p>
             <a:fld id="{30EF52CC-F3D9-41D4-BCE4-C208E61A3F31}" type="datetimeFigureOut">
               <a:rPr lang="en-US" smtClean="0"/>
-              <a:t>12/28/2018</a:t>
+              <a:t>12/29/2018</a:t>
             </a:fld>
             <a:endParaRPr lang="en-US" dirty="0"/>
           </a:p>
@@ -2116,7 +2116,7 @@
           <a:p>
             <a:fld id="{30EF52CC-F3D9-41D4-BCE4-C208E61A3F31}" type="datetimeFigureOut">
               <a:rPr lang="en-US" smtClean="0"/>
-              <a:t>12/28/2018</a:t>
+              <a:t>12/29/2018</a:t>
             </a:fld>
             <a:endParaRPr lang="en-US" dirty="0"/>
           </a:p>
@@ -2375,7 +2375,7 @@
           <a:p>
             <a:fld id="{B3CFE2CC-454D-4466-AC55-B86DA0A87BAE}" type="datetimeFigureOut">
               <a:rPr lang="en-US" smtClean="0"/>
-              <a:t>12/28/2018</a:t>
+              <a:t>12/29/2018</a:t>
             </a:fld>
             <a:endParaRPr lang="en-US" dirty="0"/>
           </a:p>
@@ -2637,7 +2637,7 @@
           <a:p>
             <a:fld id="{B647B1BF-4039-460D-A637-65428CBD720E}" type="datetimeFigureOut">
               <a:rPr lang="en-US" smtClean="0"/>
-              <a:t>12/28/2018</a:t>
+              <a:t>12/29/2018</a:t>
             </a:fld>
             <a:endParaRPr lang="en-US" dirty="0"/>
           </a:p>
@@ -2900,7 +2900,7 @@
           <a:p>
             <a:fld id="{AAA39ACE-9343-4EBE-B5CA-AEA240A1DC53}" type="datetimeFigureOut">
               <a:rPr lang="en-US" smtClean="0"/>
-              <a:t>12/28/2018</a:t>
+              <a:t>12/29/2018</a:t>
             </a:fld>
             <a:endParaRPr lang="en-US" dirty="0"/>
           </a:p>
@@ -3229,7 +3229,7 @@
           <a:p>
             <a:fld id="{C9A00F7B-89C5-4DF7-A309-6263220147D4}" type="datetimeFigureOut">
               <a:rPr lang="en-US" smtClean="0"/>
-              <a:t>12/28/2018</a:t>
+              <a:t>12/29/2018</a:t>
             </a:fld>
             <a:endParaRPr lang="en-US" dirty="0"/>
           </a:p>
@@ -3552,7 +3552,7 @@
           <a:p>
             <a:fld id="{449C95DE-FD64-4606-AE61-EC1136867CC6}" type="datetimeFigureOut">
               <a:rPr lang="en-US" smtClean="0"/>
-              <a:t>12/28/2018</a:t>
+              <a:t>12/29/2018</a:t>
             </a:fld>
             <a:endParaRPr lang="en-US" dirty="0"/>
           </a:p>
@@ -4009,7 +4009,7 @@
           <a:p>
             <a:fld id="{5DEB0BBD-30FE-4CF1-900A-0C45149F8AF8}" type="datetimeFigureOut">
               <a:rPr lang="en-US" smtClean="0"/>
-              <a:t>12/28/2018</a:t>
+              <a:t>12/29/2018</a:t>
             </a:fld>
             <a:endParaRPr lang="en-US" dirty="0"/>
           </a:p>
@@ -4214,7 +4214,7 @@
           <a:p>
             <a:fld id="{B91A5F7F-3E81-4C65-A4D1-CB62D5B9DB91}" type="datetimeFigureOut">
               <a:rPr lang="en-US" smtClean="0"/>
-              <a:t>12/28/2018</a:t>
+              <a:t>12/29/2018</a:t>
             </a:fld>
             <a:endParaRPr lang="en-US" dirty="0"/>
           </a:p>
@@ -4391,7 +4391,7 @@
           <a:p>
             <a:fld id="{377ECC86-1672-4627-AEFE-EC5485C73905}" type="datetimeFigureOut">
               <a:rPr lang="en-US" smtClean="0"/>
-              <a:t>12/28/2018</a:t>
+              <a:t>12/29/2018</a:t>
             </a:fld>
             <a:endParaRPr lang="en-US" dirty="0"/>
           </a:p>
@@ -4724,7 +4724,7 @@
           <a:p>
             <a:fld id="{3CDCB01F-D966-4C62-B900-0BE008A90C98}" type="datetimeFigureOut">
               <a:rPr lang="en-US" smtClean="0"/>
-              <a:t>12/28/2018</a:t>
+              <a:t>12/29/2018</a:t>
             </a:fld>
             <a:endParaRPr lang="en-US" dirty="0"/>
           </a:p>
@@ -5069,7 +5069,7 @@
           <a:p>
             <a:fld id="{5E73A0EA-7DC7-4964-BB97-B173EF3B859A}" type="datetimeFigureOut">
               <a:rPr lang="en-US" smtClean="0"/>
-              <a:t>12/28/2018</a:t>
+              <a:t>12/29/2018</a:t>
             </a:fld>
             <a:endParaRPr lang="en-US" dirty="0"/>
           </a:p>
@@ -7208,7 +7208,7 @@
           <a:p>
             <a:fld id="{30EF52CC-F3D9-41D4-BCE4-C208E61A3F31}" type="datetimeFigureOut">
               <a:rPr lang="en-US" smtClean="0"/>
-              <a:t>12/28/2018</a:t>
+              <a:t>12/29/2018</a:t>
             </a:fld>
             <a:endParaRPr lang="en-US" dirty="0"/>
           </a:p>
@@ -8662,50 +8662,19 @@
           <a:chExt cx="0" cy="0"/>
         </a:xfrm>
       </p:grpSpPr>
-      <p:sp>
-        <p:nvSpPr>
-          <p:cNvPr id="2" name="Title 1">
+      <p:pic>
+        <p:nvPicPr>
+          <p:cNvPr id="3074" name="Picture 2" descr="Resultado de imagen para estacionamiento mall en chile">
             <a:extLst>
               <a:ext uri="{FF2B5EF4-FFF2-40B4-BE49-F238E27FC236}">
-                <a16:creationId xmlns:a16="http://schemas.microsoft.com/office/drawing/2014/main" id="{00355B56-3C87-4D17-8657-3CA4756C7897}"/>
-              </a:ext>
-            </a:extLst>
-          </p:cNvPr>
-          <p:cNvSpPr>
-            <a:spLocks noGrp="1"/>
-          </p:cNvSpPr>
-          <p:nvPr>
-            <p:ph type="title"/>
-          </p:nvPr>
-        </p:nvSpPr>
-        <p:spPr/>
-        <p:txBody>
-          <a:bodyPr/>
-          <a:lstStyle/>
-          <a:p>
-            <a:r>
-              <a:rPr lang="es-CL" dirty="0"/>
-              <a:t>Uso en Chile</a:t>
-            </a:r>
-            <a:endParaRPr lang="en-US" dirty="0"/>
-          </a:p>
-        </p:txBody>
-      </p:sp>
-      <p:pic>
-        <p:nvPicPr>
-          <p:cNvPr id="1026" name="Picture 2" descr="Resultado de imagen para estacionamiento mall en chile">
-            <a:extLst>
-              <a:ext uri="{FF2B5EF4-FFF2-40B4-BE49-F238E27FC236}">
-                <a16:creationId xmlns:a16="http://schemas.microsoft.com/office/drawing/2014/main" id="{AE57A1FD-7F93-4B9D-AFDA-CACFEE950A44}"/>
+                <a16:creationId xmlns:a16="http://schemas.microsoft.com/office/drawing/2014/main" id="{4779C9DD-B324-4D96-B734-21194DDECB20}"/>
               </a:ext>
             </a:extLst>
           </p:cNvPr>
           <p:cNvPicPr>
-            <a:picLocks noGrp="1" noChangeAspect="1" noChangeArrowheads="1"/>
+            <a:picLocks noChangeAspect="1" noChangeArrowheads="1"/>
           </p:cNvPicPr>
-          <p:nvPr>
-            <p:ph idx="1"/>
-          </p:nvPr>
+          <p:nvPr/>
         </p:nvPicPr>
         <p:blipFill>
           <a:blip r:embed="rId2">
@@ -8722,8 +8691,8 @@
         </p:blipFill>
         <p:spPr bwMode="auto">
           <a:xfrm>
-            <a:off x="2649768" y="1661890"/>
-            <a:ext cx="6892463" cy="4572000"/>
+            <a:off x="2353340" y="685800"/>
+            <a:ext cx="7485321" cy="5486400"/>
           </a:xfrm>
           <a:prstGeom prst="rect">
             <a:avLst/>
@@ -8740,10 +8709,121 @@
           </a:extLst>
         </p:spPr>
       </p:pic>
+      <p:sp>
+        <p:nvSpPr>
+          <p:cNvPr id="5" name="Title 1">
+            <a:extLst>
+              <a:ext uri="{FF2B5EF4-FFF2-40B4-BE49-F238E27FC236}">
+                <a16:creationId xmlns:a16="http://schemas.microsoft.com/office/drawing/2014/main" id="{7E5C0DB3-25D8-4AE1-BCCF-0C03222927D5}"/>
+              </a:ext>
+            </a:extLst>
+          </p:cNvPr>
+          <p:cNvSpPr txBox="1">
+            <a:spLocks/>
+          </p:cNvSpPr>
+          <p:nvPr/>
+        </p:nvSpPr>
+        <p:spPr>
+          <a:xfrm>
+            <a:off x="409449" y="97965"/>
+            <a:ext cx="8911687" cy="1280890"/>
+          </a:xfrm>
+          <a:prstGeom prst="rect">
+            <a:avLst/>
+          </a:prstGeom>
+        </p:spPr>
+        <p:txBody>
+          <a:bodyPr vert="horz" lIns="91440" tIns="45720" rIns="91440" bIns="45720" rtlCol="0" anchor="t">
+            <a:normAutofit/>
+          </a:bodyPr>
+          <a:lstStyle>
+            <a:lvl1pPr algn="l" defTabSz="457200" rtl="0" eaLnBrk="1" latinLnBrk="0" hangingPunct="1">
+              <a:spcBef>
+                <a:spcPct val="0"/>
+              </a:spcBef>
+              <a:buNone/>
+              <a:defRPr sz="3600" kern="1200">
+                <a:solidFill>
+                  <a:schemeClr val="tx1">
+                    <a:lumMod val="85000"/>
+                    <a:lumOff val="15000"/>
+                  </a:schemeClr>
+                </a:solidFill>
+                <a:latin typeface="+mj-lt"/>
+                <a:ea typeface="+mj-ea"/>
+                <a:cs typeface="+mj-cs"/>
+              </a:defRPr>
+            </a:lvl1pPr>
+            <a:lvl2pPr eaLnBrk="1" hangingPunct="1">
+              <a:defRPr>
+                <a:solidFill>
+                  <a:schemeClr val="tx2"/>
+                </a:solidFill>
+              </a:defRPr>
+            </a:lvl2pPr>
+            <a:lvl3pPr eaLnBrk="1" hangingPunct="1">
+              <a:defRPr>
+                <a:solidFill>
+                  <a:schemeClr val="tx2"/>
+                </a:solidFill>
+              </a:defRPr>
+            </a:lvl3pPr>
+            <a:lvl4pPr eaLnBrk="1" hangingPunct="1">
+              <a:defRPr>
+                <a:solidFill>
+                  <a:schemeClr val="tx2"/>
+                </a:solidFill>
+              </a:defRPr>
+            </a:lvl4pPr>
+            <a:lvl5pPr eaLnBrk="1" hangingPunct="1">
+              <a:defRPr>
+                <a:solidFill>
+                  <a:schemeClr val="tx2"/>
+                </a:solidFill>
+              </a:defRPr>
+            </a:lvl5pPr>
+            <a:lvl6pPr eaLnBrk="1" hangingPunct="1">
+              <a:defRPr>
+                <a:solidFill>
+                  <a:schemeClr val="tx2"/>
+                </a:solidFill>
+              </a:defRPr>
+            </a:lvl6pPr>
+            <a:lvl7pPr eaLnBrk="1" hangingPunct="1">
+              <a:defRPr>
+                <a:solidFill>
+                  <a:schemeClr val="tx2"/>
+                </a:solidFill>
+              </a:defRPr>
+            </a:lvl7pPr>
+            <a:lvl8pPr eaLnBrk="1" hangingPunct="1">
+              <a:defRPr>
+                <a:solidFill>
+                  <a:schemeClr val="tx2"/>
+                </a:solidFill>
+              </a:defRPr>
+            </a:lvl8pPr>
+            <a:lvl9pPr eaLnBrk="1" hangingPunct="1">
+              <a:defRPr>
+                <a:solidFill>
+                  <a:schemeClr val="tx2"/>
+                </a:solidFill>
+              </a:defRPr>
+            </a:lvl9pPr>
+          </a:lstStyle>
+          <a:p>
+            <a:r>
+              <a:rPr lang="es-CL"/>
+              <a:t>Uso en Chile</a:t>
+            </a:r>
+            <a:endParaRPr lang="en-US" dirty="0"/>
+          </a:p>
+        </p:txBody>
+      </p:sp>
     </p:spTree>
     <p:extLst>
       <p:ext uri="{BB962C8B-B14F-4D97-AF65-F5344CB8AC3E}">
-        <p14:creationId xmlns:p14="http://schemas.microsoft.com/office/powerpoint/2010/main" val="3385040031"/>
+        <p14:creationId xmlns:p14="http://schemas.microsoft.com/office/powerpoint/2010/main" val="3067482139"/>
       </p:ext>
     </p:extLst>
   </p:cSld>
@@ -8897,69 +8977,21 @@
           <a:chExt cx="0" cy="0"/>
         </a:xfrm>
       </p:grpSpPr>
-      <p:sp>
-        <p:nvSpPr>
-          <p:cNvPr id="2" name="Title 1">
+      <p:pic>
+        <p:nvPicPr>
+          <p:cNvPr id="1026" name="Picture 2" descr="Resultado de imagen para estacionamiento mall en chile">
             <a:extLst>
               <a:ext uri="{FF2B5EF4-FFF2-40B4-BE49-F238E27FC236}">
-                <a16:creationId xmlns:a16="http://schemas.microsoft.com/office/drawing/2014/main" id="{3AAFC6B3-CA13-44C6-A8E3-A1D9A3343095}"/>
-              </a:ext>
-            </a:extLst>
-          </p:cNvPr>
-          <p:cNvSpPr>
-            <a:spLocks noGrp="1"/>
-          </p:cNvSpPr>
-          <p:nvPr>
-            <p:ph type="title"/>
-          </p:nvPr>
-        </p:nvSpPr>
-        <p:spPr/>
-        <p:txBody>
-          <a:bodyPr/>
-          <a:lstStyle/>
-          <a:p>
-            <a:endParaRPr lang="en-US"/>
-          </a:p>
-        </p:txBody>
-      </p:sp>
-      <p:sp>
-        <p:nvSpPr>
-          <p:cNvPr id="3" name="Content Placeholder 2">
-            <a:extLst>
-              <a:ext uri="{FF2B5EF4-FFF2-40B4-BE49-F238E27FC236}">
-                <a16:creationId xmlns:a16="http://schemas.microsoft.com/office/drawing/2014/main" id="{E93EC630-1776-4A97-8219-2E12382F3EFE}"/>
-              </a:ext>
-            </a:extLst>
-          </p:cNvPr>
-          <p:cNvSpPr>
-            <a:spLocks noGrp="1"/>
-          </p:cNvSpPr>
-          <p:nvPr>
-            <p:ph idx="1"/>
-          </p:nvPr>
-        </p:nvSpPr>
-        <p:spPr/>
-        <p:txBody>
-          <a:bodyPr/>
-          <a:lstStyle/>
-          <a:p>
-            <a:endParaRPr lang="en-US"/>
-          </a:p>
-        </p:txBody>
-      </p:sp>
-      <p:pic>
-        <p:nvPicPr>
-          <p:cNvPr id="3074" name="Picture 2" descr="Resultado de imagen para estacionamiento mall en chile">
-            <a:extLst>
-              <a:ext uri="{FF2B5EF4-FFF2-40B4-BE49-F238E27FC236}">
-                <a16:creationId xmlns:a16="http://schemas.microsoft.com/office/drawing/2014/main" id="{4779C9DD-B324-4D96-B734-21194DDECB20}"/>
+                <a16:creationId xmlns:a16="http://schemas.microsoft.com/office/drawing/2014/main" id="{AE57A1FD-7F93-4B9D-AFDA-CACFEE950A44}"/>
               </a:ext>
             </a:extLst>
           </p:cNvPr>
           <p:cNvPicPr>
-            <a:picLocks noChangeAspect="1" noChangeArrowheads="1"/>
+            <a:picLocks noGrp="1" noChangeAspect="1" noChangeArrowheads="1"/>
           </p:cNvPicPr>
-          <p:nvPr/>
+          <p:nvPr>
+            <p:ph idx="1"/>
+          </p:nvPr>
         </p:nvPicPr>
         <p:blipFill>
           <a:blip r:embed="rId2">
@@ -8976,8 +9008,8 @@
         </p:blipFill>
         <p:spPr bwMode="auto">
           <a:xfrm>
-            <a:off x="2353340" y="685800"/>
-            <a:ext cx="7485321" cy="5486400"/>
+            <a:off x="1960522" y="685800"/>
+            <a:ext cx="8270956" cy="5486400"/>
           </a:xfrm>
           <a:prstGeom prst="rect">
             <a:avLst/>
@@ -8997,7 +9029,7 @@
     </p:spTree>
     <p:extLst>
       <p:ext uri="{BB962C8B-B14F-4D97-AF65-F5344CB8AC3E}">
-        <p14:creationId xmlns:p14="http://schemas.microsoft.com/office/powerpoint/2010/main" val="3067482139"/>
+        <p14:creationId xmlns:p14="http://schemas.microsoft.com/office/powerpoint/2010/main" val="3385040031"/>
       </p:ext>
     </p:extLst>
   </p:cSld>
@@ -10726,7 +10758,7 @@
         </p:blipFill>
         <p:spPr bwMode="auto">
           <a:xfrm>
-            <a:off x="801544" y="2085975"/>
+            <a:off x="1408637" y="2005765"/>
             <a:ext cx="4876800" cy="3657600"/>
           </a:xfrm>
           <a:prstGeom prst="rect">

</xml_diff>

<commit_message>
pppt final del pico
</commit_message>
<xml_diff>
--- a/Presentación/Capiteles de Losa.pptx
+++ b/Presentación/Capiteles de Losa.pptx
@@ -446,7 +446,7 @@
           <a:p>
             <a:fld id="{6D22F896-40B5-4ADD-8801-0D06FADFA095}" type="slidenum">
               <a:rPr lang="en-US" smtClean="0"/>
-              <a:t>‹#›</a:t>
+              <a:t>‹Nº›</a:t>
             </a:fld>
             <a:endParaRPr lang="en-US" dirty="0"/>
           </a:p>
@@ -785,7 +785,7 @@
             <a:fld id="{6D22F896-40B5-4ADD-8801-0D06FADFA095}" type="slidenum">
               <a:rPr lang="en-US" smtClean="0"/>
               <a:pPr/>
-              <a:t>‹#›</a:t>
+              <a:t>‹Nº›</a:t>
             </a:fld>
             <a:endParaRPr lang="en-US" dirty="0"/>
           </a:p>
@@ -1188,7 +1188,7 @@
             <a:fld id="{6D22F896-40B5-4ADD-8801-0D06FADFA095}" type="slidenum">
               <a:rPr lang="en-US" smtClean="0"/>
               <a:pPr/>
-              <a:t>‹#›</a:t>
+              <a:t>‹Nº›</a:t>
             </a:fld>
             <a:endParaRPr lang="en-US" dirty="0"/>
           </a:p>
@@ -1526,7 +1526,7 @@
             <a:fld id="{6D22F896-40B5-4ADD-8801-0D06FADFA095}" type="slidenum">
               <a:rPr lang="en-US" smtClean="0"/>
               <a:pPr/>
-              <a:t>‹#›</a:t>
+              <a:t>‹Nº›</a:t>
             </a:fld>
             <a:endParaRPr lang="en-US" dirty="0"/>
           </a:p>
@@ -1848,7 +1848,7 @@
             <a:fld id="{6D22F896-40B5-4ADD-8801-0D06FADFA095}" type="slidenum">
               <a:rPr lang="en-US" smtClean="0"/>
               <a:pPr/>
-              <a:t>‹#›</a:t>
+              <a:t>‹Nº›</a:t>
             </a:fld>
             <a:endParaRPr lang="en-US" dirty="0"/>
           </a:p>
@@ -2246,7 +2246,7 @@
             <a:fld id="{6D22F896-40B5-4ADD-8801-0D06FADFA095}" type="slidenum">
               <a:rPr lang="en-US" smtClean="0"/>
               <a:pPr/>
-              <a:t>‹#›</a:t>
+              <a:t>‹Nº›</a:t>
             </a:fld>
             <a:endParaRPr lang="en-US" dirty="0"/>
           </a:p>
@@ -2499,7 +2499,7 @@
           <a:p>
             <a:fld id="{6D22F896-40B5-4ADD-8801-0D06FADFA095}" type="slidenum">
               <a:rPr lang="en-US" smtClean="0"/>
-              <a:t>‹#›</a:t>
+              <a:t>‹Nº›</a:t>
             </a:fld>
             <a:endParaRPr lang="en-US" dirty="0"/>
           </a:p>
@@ -2762,7 +2762,7 @@
             <a:fld id="{6D22F896-40B5-4ADD-8801-0D06FADFA095}" type="slidenum">
               <a:rPr lang="en-US" smtClean="0"/>
               <a:pPr/>
-              <a:t>‹#›</a:t>
+              <a:t>‹Nº›</a:t>
             </a:fld>
             <a:endParaRPr lang="en-US" dirty="0"/>
           </a:p>
@@ -3024,7 +3024,7 @@
           <a:p>
             <a:fld id="{6D22F896-40B5-4ADD-8801-0D06FADFA095}" type="slidenum">
               <a:rPr lang="en-US" smtClean="0"/>
-              <a:t>‹#›</a:t>
+              <a:t>‹Nº›</a:t>
             </a:fld>
             <a:endParaRPr lang="en-US" dirty="0"/>
           </a:p>
@@ -3358,7 +3358,7 @@
           <a:p>
             <a:fld id="{6D22F896-40B5-4ADD-8801-0D06FADFA095}" type="slidenum">
               <a:rPr lang="en-US" smtClean="0"/>
-              <a:t>‹#›</a:t>
+              <a:t>‹Nº›</a:t>
             </a:fld>
             <a:endParaRPr lang="en-US" dirty="0"/>
           </a:p>
@@ -3681,7 +3681,7 @@
           <a:p>
             <a:fld id="{6D22F896-40B5-4ADD-8801-0D06FADFA095}" type="slidenum">
               <a:rPr lang="en-US" smtClean="0"/>
-              <a:t>‹#›</a:t>
+              <a:t>‹Nº›</a:t>
             </a:fld>
             <a:endParaRPr lang="en-US" dirty="0"/>
           </a:p>
@@ -4138,7 +4138,7 @@
           <a:p>
             <a:fld id="{6D22F896-40B5-4ADD-8801-0D06FADFA095}" type="slidenum">
               <a:rPr lang="en-US" smtClean="0"/>
-              <a:t>‹#›</a:t>
+              <a:t>‹Nº›</a:t>
             </a:fld>
             <a:endParaRPr lang="en-US" dirty="0"/>
           </a:p>
@@ -4338,7 +4338,7 @@
           <a:p>
             <a:fld id="{6D22F896-40B5-4ADD-8801-0D06FADFA095}" type="slidenum">
               <a:rPr lang="en-US" smtClean="0"/>
-              <a:t>‹#›</a:t>
+              <a:t>‹Nº›</a:t>
             </a:fld>
             <a:endParaRPr lang="en-US" dirty="0"/>
           </a:p>
@@ -4515,7 +4515,7 @@
           <a:p>
             <a:fld id="{6D22F896-40B5-4ADD-8801-0D06FADFA095}" type="slidenum">
               <a:rPr lang="en-US" smtClean="0"/>
-              <a:t>‹#›</a:t>
+              <a:t>‹Nº›</a:t>
             </a:fld>
             <a:endParaRPr lang="en-US" dirty="0"/>
           </a:p>
@@ -4848,7 +4848,7 @@
           <a:p>
             <a:fld id="{6D22F896-40B5-4ADD-8801-0D06FADFA095}" type="slidenum">
               <a:rPr lang="en-US" smtClean="0"/>
-              <a:t>‹#›</a:t>
+              <a:t>‹Nº›</a:t>
             </a:fld>
             <a:endParaRPr lang="en-US" dirty="0"/>
           </a:p>
@@ -5198,7 +5198,7 @@
           <a:p>
             <a:fld id="{6D22F896-40B5-4ADD-8801-0D06FADFA095}" type="slidenum">
               <a:rPr lang="en-US" smtClean="0"/>
-              <a:t>‹#›</a:t>
+              <a:t>‹Nº›</a:t>
             </a:fld>
             <a:endParaRPr lang="en-US" dirty="0"/>
           </a:p>
@@ -7285,7 +7285,7 @@
             <a:fld id="{6D22F896-40B5-4ADD-8801-0D06FADFA095}" type="slidenum">
               <a:rPr lang="en-US" smtClean="0"/>
               <a:pPr/>
-              <a:t>‹#›</a:t>
+              <a:t>‹Nº›</a:t>
             </a:fld>
             <a:endParaRPr lang="en-US" dirty="0"/>
           </a:p>
@@ -9314,21 +9314,21 @@
           </a:bodyPr>
           <a:lstStyle/>
           <a:p>
+            <a:pPr algn="just"/>
             <a:r>
               <a:rPr lang="es-CL" sz="2000" dirty="0"/>
-              <a:t>Tipo de cimentación por losa.</a:t>
-            </a:r>
+              <a:t>Definición ACI 318: </a:t>
+            </a:r>
+            <a:r>
+              <a:rPr lang="es-ES" sz="2000" dirty="0"/>
+              <a:t>Ensanchamiento del extremo superior de una columna de concreto ubicada directamente bajo la losa o ábaco y construida monolíticamente con la columna.</a:t>
+            </a:r>
+            <a:endParaRPr lang="es-CL" sz="2000" dirty="0"/>
           </a:p>
           <a:p>
             <a:r>
               <a:rPr lang="es-CL" sz="2000" dirty="0"/>
               <a:t>Transmisión de cargas.</a:t>
-            </a:r>
-          </a:p>
-          <a:p>
-            <a:r>
-              <a:rPr lang="es-CL" sz="2000" dirty="0"/>
-              <a:t>Aumento de la resistencia de losa al punzonamiento.</a:t>
             </a:r>
           </a:p>
         </p:txBody>
@@ -9354,7 +9354,7 @@
         </p:blipFill>
         <p:spPr>
           <a:xfrm>
-            <a:off x="3546152" y="3105151"/>
+            <a:off x="5792202" y="2825730"/>
             <a:ext cx="5099694" cy="3416299"/>
           </a:xfrm>
           <a:prstGeom prst="rect">
@@ -9362,260 +9362,12 @@
           </a:prstGeom>
         </p:spPr>
       </p:pic>
-    </p:spTree>
-    <p:extLst>
-      <p:ext uri="{BB962C8B-B14F-4D97-AF65-F5344CB8AC3E}">
-        <p14:creationId xmlns:p14="http://schemas.microsoft.com/office/powerpoint/2010/main" val="3970448412"/>
-      </p:ext>
-    </p:extLst>
-  </p:cSld>
-  <p:clrMapOvr>
-    <a:masterClrMapping/>
-  </p:clrMapOvr>
-</p:sld>
-</file>
-
-<file path=ppt/slides/slide3.xml><?xml version="1.0" encoding="utf-8"?>
-<p:sld xmlns:a="http://schemas.openxmlformats.org/drawingml/2006/main" xmlns:r="http://schemas.openxmlformats.org/officeDocument/2006/relationships" xmlns:p="http://schemas.openxmlformats.org/presentationml/2006/main">
-  <p:cSld>
-    <p:spTree>
-      <p:nvGrpSpPr>
-        <p:cNvPr id="1" name=""/>
-        <p:cNvGrpSpPr/>
-        <p:nvPr/>
-      </p:nvGrpSpPr>
-      <p:grpSpPr>
-        <a:xfrm>
-          <a:off x="0" y="0"/>
-          <a:ext cx="0" cy="0"/>
-          <a:chOff x="0" y="0"/>
-          <a:chExt cx="0" cy="0"/>
-        </a:xfrm>
-      </p:grpSpPr>
-      <p:sp>
-        <p:nvSpPr>
-          <p:cNvPr id="2" name="Título 1">
+      <p:sp>
+        <p:nvSpPr>
+          <p:cNvPr id="6" name="Marcador de contenido 2">
             <a:extLst>
               <a:ext uri="{FF2B5EF4-FFF2-40B4-BE49-F238E27FC236}">
-                <a16:creationId xmlns:a16="http://schemas.microsoft.com/office/drawing/2014/main" id="{9D3605E1-F2CB-4141-8053-D9431626F7B6}"/>
-              </a:ext>
-            </a:extLst>
-          </p:cNvPr>
-          <p:cNvSpPr>
-            <a:spLocks noGrp="1"/>
-          </p:cNvSpPr>
-          <p:nvPr>
-            <p:ph type="title"/>
-          </p:nvPr>
-        </p:nvSpPr>
-        <p:spPr>
-          <a:xfrm>
-            <a:off x="1792825" y="420910"/>
-            <a:ext cx="8911687" cy="1280890"/>
-          </a:xfrm>
-        </p:spPr>
-        <p:txBody>
-          <a:bodyPr/>
-          <a:lstStyle/>
-          <a:p>
-            <a:r>
-              <a:rPr lang="es-CL" u="sng" dirty="0"/>
-              <a:t>¿Qué es el punzonamiento?</a:t>
-            </a:r>
-          </a:p>
-        </p:txBody>
-      </p:sp>
-      <p:sp>
-        <p:nvSpPr>
-          <p:cNvPr id="3" name="Marcador de contenido 2">
-            <a:extLst>
-              <a:ext uri="{FF2B5EF4-FFF2-40B4-BE49-F238E27FC236}">
-                <a16:creationId xmlns:a16="http://schemas.microsoft.com/office/drawing/2014/main" id="{4B093DBA-859C-4775-8475-54866A42834D}"/>
-              </a:ext>
-            </a:extLst>
-          </p:cNvPr>
-          <p:cNvSpPr>
-            <a:spLocks noGrp="1"/>
-          </p:cNvSpPr>
-          <p:nvPr>
-            <p:ph idx="1"/>
-          </p:nvPr>
-        </p:nvSpPr>
-        <p:spPr>
-          <a:xfrm>
-            <a:off x="400802" y="1540189"/>
-            <a:ext cx="8915400" cy="3777622"/>
-          </a:xfrm>
-        </p:spPr>
-        <p:txBody>
-          <a:bodyPr/>
-          <a:lstStyle/>
-          <a:p>
-            <a:r>
-              <a:rPr lang="es-CL" dirty="0"/>
-              <a:t>Tensión tangencial propia de encuentros entre elementos planos.</a:t>
-            </a:r>
-          </a:p>
-          <a:p>
-            <a:r>
-              <a:rPr lang="es-CL" dirty="0"/>
-              <a:t>Generada cuando cargas muy importantes reposan sobre superficies muy pequeñas. </a:t>
-            </a:r>
-          </a:p>
-          <a:p>
-            <a:r>
-              <a:rPr lang="es-CL" dirty="0"/>
-              <a:t>Se </a:t>
-            </a:r>
-            <a:r>
-              <a:rPr lang="es-CL" dirty="0">
-                <a:solidFill>
-                  <a:srgbClr val="FF0000"/>
-                </a:solidFill>
-              </a:rPr>
-              <a:t>incrementa a menor sección del pilar </a:t>
-            </a:r>
-            <a:r>
-              <a:rPr lang="es-CL" dirty="0"/>
-              <a:t>o mayor carga.</a:t>
-            </a:r>
-          </a:p>
-        </p:txBody>
-      </p:sp>
-      <p:pic>
-        <p:nvPicPr>
-          <p:cNvPr id="5" name="Imagen 4">
-            <a:extLst>
-              <a:ext uri="{FF2B5EF4-FFF2-40B4-BE49-F238E27FC236}">
-                <a16:creationId xmlns:a16="http://schemas.microsoft.com/office/drawing/2014/main" id="{C821106B-463A-43A1-924C-94B04D0DD7AF}"/>
-              </a:ext>
-            </a:extLst>
-          </p:cNvPr>
-          <p:cNvPicPr>
-            <a:picLocks noChangeAspect="1"/>
-          </p:cNvPicPr>
-          <p:nvPr/>
-        </p:nvPicPr>
-        <p:blipFill rotWithShape="1">
-          <a:blip r:embed="rId2"/>
-          <a:srcRect l="7828" t="4955" r="5759" b="5092"/>
-          <a:stretch/>
-        </p:blipFill>
-        <p:spPr>
-          <a:xfrm>
-            <a:off x="6934201" y="3009899"/>
-            <a:ext cx="3644900" cy="3427191"/>
-          </a:xfrm>
-          <a:prstGeom prst="rect">
-            <a:avLst/>
-          </a:prstGeom>
-        </p:spPr>
-      </p:pic>
-      <p:pic>
-        <p:nvPicPr>
-          <p:cNvPr id="6" name="Imagen 5">
-            <a:extLst>
-              <a:ext uri="{FF2B5EF4-FFF2-40B4-BE49-F238E27FC236}">
-                <a16:creationId xmlns:a16="http://schemas.microsoft.com/office/drawing/2014/main" id="{B87FF74E-2BA7-4FCB-82BB-4F0B39D58C45}"/>
-              </a:ext>
-            </a:extLst>
-          </p:cNvPr>
-          <p:cNvPicPr>
-            <a:picLocks noChangeAspect="1"/>
-          </p:cNvPicPr>
-          <p:nvPr/>
-        </p:nvPicPr>
-        <p:blipFill>
-          <a:blip r:embed="rId3"/>
-          <a:stretch>
-            <a:fillRect/>
-          </a:stretch>
-        </p:blipFill>
-        <p:spPr>
-          <a:xfrm>
-            <a:off x="1562368" y="3142174"/>
-            <a:ext cx="4686300" cy="3419475"/>
-          </a:xfrm>
-          <a:prstGeom prst="rect">
-            <a:avLst/>
-          </a:prstGeom>
-        </p:spPr>
-      </p:pic>
-    </p:spTree>
-    <p:extLst>
-      <p:ext uri="{BB962C8B-B14F-4D97-AF65-F5344CB8AC3E}">
-        <p14:creationId xmlns:p14="http://schemas.microsoft.com/office/powerpoint/2010/main" val="3939470053"/>
-      </p:ext>
-    </p:extLst>
-  </p:cSld>
-  <p:clrMapOvr>
-    <a:masterClrMapping/>
-  </p:clrMapOvr>
-</p:sld>
-</file>
-
-<file path=ppt/slides/slide4.xml><?xml version="1.0" encoding="utf-8"?>
-<p:sld xmlns:a="http://schemas.openxmlformats.org/drawingml/2006/main" xmlns:r="http://schemas.openxmlformats.org/officeDocument/2006/relationships" xmlns:p="http://schemas.openxmlformats.org/presentationml/2006/main">
-  <p:cSld>
-    <p:spTree>
-      <p:nvGrpSpPr>
-        <p:cNvPr id="1" name=""/>
-        <p:cNvGrpSpPr/>
-        <p:nvPr/>
-      </p:nvGrpSpPr>
-      <p:grpSpPr>
-        <a:xfrm>
-          <a:off x="0" y="0"/>
-          <a:ext cx="0" cy="0"/>
-          <a:chOff x="0" y="0"/>
-          <a:chExt cx="0" cy="0"/>
-        </a:xfrm>
-      </p:grpSpPr>
-      <p:sp>
-        <p:nvSpPr>
-          <p:cNvPr id="3" name="Marcador de contenido 2">
-            <a:extLst>
-              <a:ext uri="{FF2B5EF4-FFF2-40B4-BE49-F238E27FC236}">
-                <a16:creationId xmlns:a16="http://schemas.microsoft.com/office/drawing/2014/main" id="{C20DD150-E59E-4075-B9EC-CC9C79ED4B75}"/>
-              </a:ext>
-            </a:extLst>
-          </p:cNvPr>
-          <p:cNvSpPr>
-            <a:spLocks noGrp="1"/>
-          </p:cNvSpPr>
-          <p:nvPr>
-            <p:ph idx="1"/>
-          </p:nvPr>
-        </p:nvSpPr>
-        <p:spPr>
-          <a:xfrm>
-            <a:off x="354012" y="1540189"/>
-            <a:ext cx="8915400" cy="3777622"/>
-          </a:xfrm>
-        </p:spPr>
-        <p:txBody>
-          <a:bodyPr/>
-          <a:lstStyle/>
-          <a:p>
-            <a:r>
-              <a:rPr lang="es-CL" u="sng" dirty="0"/>
-              <a:t>Capiteles Egipcios:</a:t>
-            </a:r>
-          </a:p>
-          <a:p>
-            <a:pPr marL="0" indent="0">
-              <a:buNone/>
-            </a:pPr>
-            <a:endParaRPr lang="es-CL" dirty="0"/>
-          </a:p>
-        </p:txBody>
-      </p:sp>
-      <p:sp>
-        <p:nvSpPr>
-          <p:cNvPr id="11" name="Marcador de contenido 2">
-            <a:extLst>
-              <a:ext uri="{FF2B5EF4-FFF2-40B4-BE49-F238E27FC236}">
-                <a16:creationId xmlns:a16="http://schemas.microsoft.com/office/drawing/2014/main" id="{D2934A02-D961-41F9-ADEB-686C4131A49B}"/>
+                <a16:creationId xmlns:a16="http://schemas.microsoft.com/office/drawing/2014/main" id="{12D4E0F0-1130-4BED-8FC8-3D032887E999}"/>
               </a:ext>
             </a:extLst>
           </p:cNvPr>
@@ -9626,8 +9378,8 @@
         </p:nvSpPr>
         <p:spPr>
           <a:xfrm>
-            <a:off x="6502400" y="3038238"/>
-            <a:ext cx="4684712" cy="2156061"/>
+            <a:off x="343435" y="1478422"/>
+            <a:ext cx="5752564" cy="3599316"/>
           </a:xfrm>
           <a:prstGeom prst="rect">
             <a:avLst/>
@@ -9856,100 +9608,29 @@
             </a:lvl9pPr>
           </a:lstStyle>
           <a:p>
-            <a:pPr algn="just"/>
-            <a:r>
-              <a:rPr lang="es-ES" i="1" dirty="0"/>
-              <a:t>Inspirados en la “estilización” de motivos florales del imperio.</a:t>
-            </a:r>
-          </a:p>
-          <a:p>
-            <a:pPr algn="just"/>
-            <a:r>
-              <a:rPr lang="es-ES" i="1" dirty="0"/>
-              <a:t>Papiriformes (emblema del Bajo Egipto).</a:t>
-            </a:r>
-          </a:p>
-          <a:p>
-            <a:pPr algn="just"/>
-            <a:r>
-              <a:rPr lang="es-CL" i="1" dirty="0"/>
-              <a:t>Lotiformes (símbolo del Alto Egipto).</a:t>
-            </a:r>
-            <a:br>
-              <a:rPr lang="es-ES" dirty="0"/>
-            </a:br>
-            <a:endParaRPr lang="es-CL" dirty="0"/>
-          </a:p>
-        </p:txBody>
-      </p:sp>
-      <p:sp>
-        <p:nvSpPr>
-          <p:cNvPr id="12" name="Título 1">
-            <a:extLst>
-              <a:ext uri="{FF2B5EF4-FFF2-40B4-BE49-F238E27FC236}">
-                <a16:creationId xmlns:a16="http://schemas.microsoft.com/office/drawing/2014/main" id="{A4A68AC4-EEA3-4991-A997-F4B93F5E0D79}"/>
-              </a:ext>
-            </a:extLst>
-          </p:cNvPr>
-          <p:cNvSpPr>
-            <a:spLocks noGrp="1"/>
-          </p:cNvSpPr>
-          <p:nvPr>
-            <p:ph type="title"/>
-          </p:nvPr>
-        </p:nvSpPr>
-        <p:spPr>
-          <a:xfrm>
-            <a:off x="1587500" y="658510"/>
-            <a:ext cx="2108200" cy="760190"/>
-          </a:xfrm>
-        </p:spPr>
-        <p:txBody>
-          <a:bodyPr/>
-          <a:lstStyle/>
-          <a:p>
-            <a:pPr algn="ctr"/>
-            <a:r>
-              <a:rPr lang="es-CL" u="sng" dirty="0"/>
-              <a:t>Historia</a:t>
-            </a:r>
-          </a:p>
-        </p:txBody>
-      </p:sp>
-      <p:pic>
-        <p:nvPicPr>
-          <p:cNvPr id="13" name="Imagen 12">
-            <a:extLst>
-              <a:ext uri="{FF2B5EF4-FFF2-40B4-BE49-F238E27FC236}">
-                <a16:creationId xmlns:a16="http://schemas.microsoft.com/office/drawing/2014/main" id="{960D3A6B-0970-41C2-A93D-077FD9893613}"/>
-              </a:ext>
-            </a:extLst>
-          </p:cNvPr>
-          <p:cNvPicPr>
-            <a:picLocks noChangeAspect="1"/>
-          </p:cNvPicPr>
-          <p:nvPr/>
-        </p:nvPicPr>
-        <p:blipFill>
-          <a:blip r:embed="rId2"/>
-          <a:stretch>
-            <a:fillRect/>
-          </a:stretch>
-        </p:blipFill>
-        <p:spPr>
-          <a:xfrm>
-            <a:off x="618331" y="2546350"/>
-            <a:ext cx="5619750" cy="2476500"/>
-          </a:xfrm>
-          <a:prstGeom prst="rect">
-            <a:avLst/>
-          </a:prstGeom>
-        </p:spPr>
-      </p:pic>
+            <a:endParaRPr lang="es-CL" sz="2000" dirty="0"/>
+          </a:p>
+          <a:p>
+            <a:endParaRPr lang="es-CL" sz="2000" dirty="0"/>
+          </a:p>
+          <a:p>
+            <a:endParaRPr lang="es-CL" sz="2000" dirty="0"/>
+          </a:p>
+          <a:p>
+            <a:endParaRPr lang="es-CL" sz="2000" dirty="0"/>
+          </a:p>
+          <a:p>
+            <a:r>
+              <a:rPr lang="es-CL" sz="2000" dirty="0"/>
+              <a:t>Aumento de la resistencia de losa al punzonamiento.</a:t>
+            </a:r>
+          </a:p>
+        </p:txBody>
+      </p:sp>
     </p:spTree>
     <p:extLst>
       <p:ext uri="{BB962C8B-B14F-4D97-AF65-F5344CB8AC3E}">
-        <p14:creationId xmlns:p14="http://schemas.microsoft.com/office/powerpoint/2010/main" val="2480573033"/>
+        <p14:creationId xmlns:p14="http://schemas.microsoft.com/office/powerpoint/2010/main" val="3970448412"/>
       </p:ext>
     </p:extLst>
   </p:cSld>
@@ -9959,7 +9640,7 @@
 </p:sld>
 </file>
 
-<file path=ppt/slides/slide5.xml><?xml version="1.0" encoding="utf-8"?>
+<file path=ppt/slides/slide3.xml><?xml version="1.0" encoding="utf-8"?>
 <p:sld xmlns:a="http://schemas.openxmlformats.org/drawingml/2006/main" xmlns:r="http://schemas.openxmlformats.org/officeDocument/2006/relationships" xmlns:p="http://schemas.openxmlformats.org/presentationml/2006/main">
   <p:cSld>
     <p:spTree>
@@ -9978,6 +9659,185 @@
       </p:grpSpPr>
       <p:sp>
         <p:nvSpPr>
+          <p:cNvPr id="2" name="Título 1">
+            <a:extLst>
+              <a:ext uri="{FF2B5EF4-FFF2-40B4-BE49-F238E27FC236}">
+                <a16:creationId xmlns:a16="http://schemas.microsoft.com/office/drawing/2014/main" id="{9D3605E1-F2CB-4141-8053-D9431626F7B6}"/>
+              </a:ext>
+            </a:extLst>
+          </p:cNvPr>
+          <p:cNvSpPr>
+            <a:spLocks noGrp="1"/>
+          </p:cNvSpPr>
+          <p:nvPr>
+            <p:ph type="title"/>
+          </p:nvPr>
+        </p:nvSpPr>
+        <p:spPr>
+          <a:xfrm>
+            <a:off x="1792825" y="420910"/>
+            <a:ext cx="8911687" cy="1280890"/>
+          </a:xfrm>
+        </p:spPr>
+        <p:txBody>
+          <a:bodyPr/>
+          <a:lstStyle/>
+          <a:p>
+            <a:r>
+              <a:rPr lang="es-CL" u="sng" dirty="0"/>
+              <a:t>¿Qué es el punzonamiento?</a:t>
+            </a:r>
+          </a:p>
+        </p:txBody>
+      </p:sp>
+      <p:sp>
+        <p:nvSpPr>
+          <p:cNvPr id="3" name="Marcador de contenido 2">
+            <a:extLst>
+              <a:ext uri="{FF2B5EF4-FFF2-40B4-BE49-F238E27FC236}">
+                <a16:creationId xmlns:a16="http://schemas.microsoft.com/office/drawing/2014/main" id="{4B093DBA-859C-4775-8475-54866A42834D}"/>
+              </a:ext>
+            </a:extLst>
+          </p:cNvPr>
+          <p:cNvSpPr>
+            <a:spLocks noGrp="1"/>
+          </p:cNvSpPr>
+          <p:nvPr>
+            <p:ph idx="1"/>
+          </p:nvPr>
+        </p:nvSpPr>
+        <p:spPr>
+          <a:xfrm>
+            <a:off x="400802" y="1540189"/>
+            <a:ext cx="8915400" cy="3777622"/>
+          </a:xfrm>
+        </p:spPr>
+        <p:txBody>
+          <a:bodyPr/>
+          <a:lstStyle/>
+          <a:p>
+            <a:r>
+              <a:rPr lang="es-CL" dirty="0"/>
+              <a:t>Tensión tangencial propia de encuentros entre elementos planos.</a:t>
+            </a:r>
+          </a:p>
+          <a:p>
+            <a:r>
+              <a:rPr lang="es-CL" dirty="0"/>
+              <a:t>Generada cuando cargas muy importantes reposan sobre superficies muy pequeñas. </a:t>
+            </a:r>
+          </a:p>
+          <a:p>
+            <a:r>
+              <a:rPr lang="es-CL" dirty="0"/>
+              <a:t>Se </a:t>
+            </a:r>
+            <a:r>
+              <a:rPr lang="es-CL" dirty="0">
+                <a:solidFill>
+                  <a:srgbClr val="FF0000"/>
+                </a:solidFill>
+              </a:rPr>
+              <a:t>incrementa a menor sección del pilar </a:t>
+            </a:r>
+            <a:r>
+              <a:rPr lang="es-CL" dirty="0"/>
+              <a:t>o mayor carga.</a:t>
+            </a:r>
+          </a:p>
+        </p:txBody>
+      </p:sp>
+      <p:pic>
+        <p:nvPicPr>
+          <p:cNvPr id="5" name="Imagen 4">
+            <a:extLst>
+              <a:ext uri="{FF2B5EF4-FFF2-40B4-BE49-F238E27FC236}">
+                <a16:creationId xmlns:a16="http://schemas.microsoft.com/office/drawing/2014/main" id="{C821106B-463A-43A1-924C-94B04D0DD7AF}"/>
+              </a:ext>
+            </a:extLst>
+          </p:cNvPr>
+          <p:cNvPicPr>
+            <a:picLocks noChangeAspect="1"/>
+          </p:cNvPicPr>
+          <p:nvPr/>
+        </p:nvPicPr>
+        <p:blipFill rotWithShape="1">
+          <a:blip r:embed="rId2"/>
+          <a:srcRect l="7828" t="4955" r="5759" b="5092"/>
+          <a:stretch/>
+        </p:blipFill>
+        <p:spPr>
+          <a:xfrm>
+            <a:off x="6934201" y="3009899"/>
+            <a:ext cx="3644900" cy="3427191"/>
+          </a:xfrm>
+          <a:prstGeom prst="rect">
+            <a:avLst/>
+          </a:prstGeom>
+        </p:spPr>
+      </p:pic>
+      <p:pic>
+        <p:nvPicPr>
+          <p:cNvPr id="6" name="Imagen 5">
+            <a:extLst>
+              <a:ext uri="{FF2B5EF4-FFF2-40B4-BE49-F238E27FC236}">
+                <a16:creationId xmlns:a16="http://schemas.microsoft.com/office/drawing/2014/main" id="{B87FF74E-2BA7-4FCB-82BB-4F0B39D58C45}"/>
+              </a:ext>
+            </a:extLst>
+          </p:cNvPr>
+          <p:cNvPicPr>
+            <a:picLocks noChangeAspect="1"/>
+          </p:cNvPicPr>
+          <p:nvPr/>
+        </p:nvPicPr>
+        <p:blipFill>
+          <a:blip r:embed="rId3"/>
+          <a:stretch>
+            <a:fillRect/>
+          </a:stretch>
+        </p:blipFill>
+        <p:spPr>
+          <a:xfrm>
+            <a:off x="1562368" y="3142174"/>
+            <a:ext cx="4686300" cy="3419475"/>
+          </a:xfrm>
+          <a:prstGeom prst="rect">
+            <a:avLst/>
+          </a:prstGeom>
+        </p:spPr>
+      </p:pic>
+    </p:spTree>
+    <p:extLst>
+      <p:ext uri="{BB962C8B-B14F-4D97-AF65-F5344CB8AC3E}">
+        <p14:creationId xmlns:p14="http://schemas.microsoft.com/office/powerpoint/2010/main" val="3939470053"/>
+      </p:ext>
+    </p:extLst>
+  </p:cSld>
+  <p:clrMapOvr>
+    <a:masterClrMapping/>
+  </p:clrMapOvr>
+</p:sld>
+</file>
+
+<file path=ppt/slides/slide4.xml><?xml version="1.0" encoding="utf-8"?>
+<p:sld xmlns:a="http://schemas.openxmlformats.org/drawingml/2006/main" xmlns:r="http://schemas.openxmlformats.org/officeDocument/2006/relationships" xmlns:p="http://schemas.openxmlformats.org/presentationml/2006/main">
+  <p:cSld>
+    <p:spTree>
+      <p:nvGrpSpPr>
+        <p:cNvPr id="1" name=""/>
+        <p:cNvGrpSpPr/>
+        <p:nvPr/>
+      </p:nvGrpSpPr>
+      <p:grpSpPr>
+        <a:xfrm>
+          <a:off x="0" y="0"/>
+          <a:ext cx="0" cy="0"/>
+          <a:chOff x="0" y="0"/>
+          <a:chExt cx="0" cy="0"/>
+        </a:xfrm>
+      </p:grpSpPr>
+      <p:sp>
+        <p:nvSpPr>
           <p:cNvPr id="3" name="Marcador de contenido 2">
             <a:extLst>
               <a:ext uri="{FF2B5EF4-FFF2-40B4-BE49-F238E27FC236}">
@@ -10004,7 +9864,7 @@
           <a:p>
             <a:r>
               <a:rPr lang="es-CL" u="sng" dirty="0"/>
-              <a:t>Capiteles Griegos:</a:t>
+              <a:t>Capiteles Egipcios:</a:t>
             </a:r>
           </a:p>
           <a:p>
@@ -10031,8 +9891,8 @@
         </p:nvSpPr>
         <p:spPr>
           <a:xfrm>
-            <a:off x="6015803" y="2662990"/>
-            <a:ext cx="5822185" cy="3240506"/>
+            <a:off x="6502400" y="3038238"/>
+            <a:ext cx="4684712" cy="2156061"/>
           </a:xfrm>
           <a:prstGeom prst="rect">
             <a:avLst/>
@@ -10264,6 +10124,411 @@
             <a:pPr algn="just"/>
             <a:r>
               <a:rPr lang="es-ES" i="1" dirty="0"/>
+              <a:t>Inspirados en la “estilización” de motivos florales del imperio.</a:t>
+            </a:r>
+          </a:p>
+          <a:p>
+            <a:pPr algn="just"/>
+            <a:r>
+              <a:rPr lang="es-ES" i="1" dirty="0"/>
+              <a:t>Papiriformes (emblema del Bajo Egipto).</a:t>
+            </a:r>
+          </a:p>
+          <a:p>
+            <a:pPr algn="just"/>
+            <a:r>
+              <a:rPr lang="es-CL" i="1" dirty="0"/>
+              <a:t>Lotiformes (símbolo del Alto Egipto).</a:t>
+            </a:r>
+            <a:br>
+              <a:rPr lang="es-ES" dirty="0"/>
+            </a:br>
+            <a:endParaRPr lang="es-CL" dirty="0"/>
+          </a:p>
+        </p:txBody>
+      </p:sp>
+      <p:sp>
+        <p:nvSpPr>
+          <p:cNvPr id="12" name="Título 1">
+            <a:extLst>
+              <a:ext uri="{FF2B5EF4-FFF2-40B4-BE49-F238E27FC236}">
+                <a16:creationId xmlns:a16="http://schemas.microsoft.com/office/drawing/2014/main" id="{A4A68AC4-EEA3-4991-A997-F4B93F5E0D79}"/>
+              </a:ext>
+            </a:extLst>
+          </p:cNvPr>
+          <p:cNvSpPr>
+            <a:spLocks noGrp="1"/>
+          </p:cNvSpPr>
+          <p:nvPr>
+            <p:ph type="title"/>
+          </p:nvPr>
+        </p:nvSpPr>
+        <p:spPr>
+          <a:xfrm>
+            <a:off x="1587500" y="658510"/>
+            <a:ext cx="2108200" cy="760190"/>
+          </a:xfrm>
+        </p:spPr>
+        <p:txBody>
+          <a:bodyPr/>
+          <a:lstStyle/>
+          <a:p>
+            <a:pPr algn="ctr"/>
+            <a:r>
+              <a:rPr lang="es-CL" u="sng" dirty="0"/>
+              <a:t>Historia</a:t>
+            </a:r>
+          </a:p>
+        </p:txBody>
+      </p:sp>
+      <p:pic>
+        <p:nvPicPr>
+          <p:cNvPr id="13" name="Imagen 12">
+            <a:extLst>
+              <a:ext uri="{FF2B5EF4-FFF2-40B4-BE49-F238E27FC236}">
+                <a16:creationId xmlns:a16="http://schemas.microsoft.com/office/drawing/2014/main" id="{960D3A6B-0970-41C2-A93D-077FD9893613}"/>
+              </a:ext>
+            </a:extLst>
+          </p:cNvPr>
+          <p:cNvPicPr>
+            <a:picLocks noChangeAspect="1"/>
+          </p:cNvPicPr>
+          <p:nvPr/>
+        </p:nvPicPr>
+        <p:blipFill>
+          <a:blip r:embed="rId2"/>
+          <a:stretch>
+            <a:fillRect/>
+          </a:stretch>
+        </p:blipFill>
+        <p:spPr>
+          <a:xfrm>
+            <a:off x="618331" y="2546350"/>
+            <a:ext cx="5619750" cy="2476500"/>
+          </a:xfrm>
+          <a:prstGeom prst="rect">
+            <a:avLst/>
+          </a:prstGeom>
+        </p:spPr>
+      </p:pic>
+    </p:spTree>
+    <p:extLst>
+      <p:ext uri="{BB962C8B-B14F-4D97-AF65-F5344CB8AC3E}">
+        <p14:creationId xmlns:p14="http://schemas.microsoft.com/office/powerpoint/2010/main" val="2480573033"/>
+      </p:ext>
+    </p:extLst>
+  </p:cSld>
+  <p:clrMapOvr>
+    <a:masterClrMapping/>
+  </p:clrMapOvr>
+</p:sld>
+</file>
+
+<file path=ppt/slides/slide5.xml><?xml version="1.0" encoding="utf-8"?>
+<p:sld xmlns:a="http://schemas.openxmlformats.org/drawingml/2006/main" xmlns:r="http://schemas.openxmlformats.org/officeDocument/2006/relationships" xmlns:p="http://schemas.openxmlformats.org/presentationml/2006/main">
+  <p:cSld>
+    <p:spTree>
+      <p:nvGrpSpPr>
+        <p:cNvPr id="1" name=""/>
+        <p:cNvGrpSpPr/>
+        <p:nvPr/>
+      </p:nvGrpSpPr>
+      <p:grpSpPr>
+        <a:xfrm>
+          <a:off x="0" y="0"/>
+          <a:ext cx="0" cy="0"/>
+          <a:chOff x="0" y="0"/>
+          <a:chExt cx="0" cy="0"/>
+        </a:xfrm>
+      </p:grpSpPr>
+      <p:sp>
+        <p:nvSpPr>
+          <p:cNvPr id="3" name="Marcador de contenido 2">
+            <a:extLst>
+              <a:ext uri="{FF2B5EF4-FFF2-40B4-BE49-F238E27FC236}">
+                <a16:creationId xmlns:a16="http://schemas.microsoft.com/office/drawing/2014/main" id="{C20DD150-E59E-4075-B9EC-CC9C79ED4B75}"/>
+              </a:ext>
+            </a:extLst>
+          </p:cNvPr>
+          <p:cNvSpPr>
+            <a:spLocks noGrp="1"/>
+          </p:cNvSpPr>
+          <p:nvPr>
+            <p:ph idx="1"/>
+          </p:nvPr>
+        </p:nvSpPr>
+        <p:spPr>
+          <a:xfrm>
+            <a:off x="354012" y="1540189"/>
+            <a:ext cx="8915400" cy="3777622"/>
+          </a:xfrm>
+        </p:spPr>
+        <p:txBody>
+          <a:bodyPr/>
+          <a:lstStyle/>
+          <a:p>
+            <a:r>
+              <a:rPr lang="es-CL" u="sng" dirty="0"/>
+              <a:t>Capiteles Griegos:</a:t>
+            </a:r>
+          </a:p>
+          <a:p>
+            <a:pPr marL="0" indent="0">
+              <a:buNone/>
+            </a:pPr>
+            <a:endParaRPr lang="es-CL" dirty="0"/>
+          </a:p>
+        </p:txBody>
+      </p:sp>
+      <p:sp>
+        <p:nvSpPr>
+          <p:cNvPr id="11" name="Marcador de contenido 2">
+            <a:extLst>
+              <a:ext uri="{FF2B5EF4-FFF2-40B4-BE49-F238E27FC236}">
+                <a16:creationId xmlns:a16="http://schemas.microsoft.com/office/drawing/2014/main" id="{D2934A02-D961-41F9-ADEB-686C4131A49B}"/>
+              </a:ext>
+            </a:extLst>
+          </p:cNvPr>
+          <p:cNvSpPr txBox="1">
+            <a:spLocks/>
+          </p:cNvSpPr>
+          <p:nvPr/>
+        </p:nvSpPr>
+        <p:spPr>
+          <a:xfrm>
+            <a:off x="6015803" y="2662990"/>
+            <a:ext cx="5822185" cy="3240506"/>
+          </a:xfrm>
+          <a:prstGeom prst="rect">
+            <a:avLst/>
+          </a:prstGeom>
+        </p:spPr>
+        <p:txBody>
+          <a:bodyPr vert="horz" lIns="91440" tIns="45720" rIns="91440" bIns="45720" rtlCol="0">
+            <a:normAutofit/>
+          </a:bodyPr>
+          <a:lstStyle>
+            <a:lvl1pPr marL="342900" indent="-342900" algn="l" defTabSz="457200" rtl="0" eaLnBrk="1" latinLnBrk="0" hangingPunct="1">
+              <a:spcBef>
+                <a:spcPts val="1000"/>
+              </a:spcBef>
+              <a:spcAft>
+                <a:spcPts val="0"/>
+              </a:spcAft>
+              <a:buClr>
+                <a:schemeClr val="accent1"/>
+              </a:buClr>
+              <a:buFont typeface="Wingdings 3" charset="2"/>
+              <a:buChar char=""/>
+              <a:defRPr sz="1800" kern="1200">
+                <a:solidFill>
+                  <a:schemeClr val="tx1">
+                    <a:lumMod val="75000"/>
+                    <a:lumOff val="25000"/>
+                  </a:schemeClr>
+                </a:solidFill>
+                <a:latin typeface="+mn-lt"/>
+                <a:ea typeface="+mn-ea"/>
+                <a:cs typeface="+mn-cs"/>
+              </a:defRPr>
+            </a:lvl1pPr>
+            <a:lvl2pPr marL="742950" indent="-285750" algn="l" defTabSz="457200" rtl="0" eaLnBrk="1" latinLnBrk="0" hangingPunct="1">
+              <a:spcBef>
+                <a:spcPts val="1000"/>
+              </a:spcBef>
+              <a:spcAft>
+                <a:spcPts val="0"/>
+              </a:spcAft>
+              <a:buClr>
+                <a:schemeClr val="accent1"/>
+              </a:buClr>
+              <a:buFont typeface="Wingdings 3" charset="2"/>
+              <a:buChar char=""/>
+              <a:defRPr sz="1600" kern="1200">
+                <a:solidFill>
+                  <a:schemeClr val="tx1">
+                    <a:lumMod val="75000"/>
+                    <a:lumOff val="25000"/>
+                  </a:schemeClr>
+                </a:solidFill>
+                <a:latin typeface="+mn-lt"/>
+                <a:ea typeface="+mn-ea"/>
+                <a:cs typeface="+mn-cs"/>
+              </a:defRPr>
+            </a:lvl2pPr>
+            <a:lvl3pPr marL="1143000" indent="-228600" algn="l" defTabSz="457200" rtl="0" eaLnBrk="1" latinLnBrk="0" hangingPunct="1">
+              <a:spcBef>
+                <a:spcPts val="1000"/>
+              </a:spcBef>
+              <a:spcAft>
+                <a:spcPts val="0"/>
+              </a:spcAft>
+              <a:buClr>
+                <a:schemeClr val="accent1"/>
+              </a:buClr>
+              <a:buFont typeface="Wingdings 3" charset="2"/>
+              <a:buChar char=""/>
+              <a:defRPr sz="1400" kern="1200">
+                <a:solidFill>
+                  <a:schemeClr val="tx1">
+                    <a:lumMod val="75000"/>
+                    <a:lumOff val="25000"/>
+                  </a:schemeClr>
+                </a:solidFill>
+                <a:latin typeface="+mn-lt"/>
+                <a:ea typeface="+mn-ea"/>
+                <a:cs typeface="+mn-cs"/>
+              </a:defRPr>
+            </a:lvl3pPr>
+            <a:lvl4pPr marL="1600200" indent="-228600" algn="l" defTabSz="457200" rtl="0" eaLnBrk="1" latinLnBrk="0" hangingPunct="1">
+              <a:spcBef>
+                <a:spcPts val="1000"/>
+              </a:spcBef>
+              <a:spcAft>
+                <a:spcPts val="0"/>
+              </a:spcAft>
+              <a:buClr>
+                <a:schemeClr val="accent1"/>
+              </a:buClr>
+              <a:buFont typeface="Wingdings 3" charset="2"/>
+              <a:buChar char=""/>
+              <a:defRPr sz="1200" kern="1200">
+                <a:solidFill>
+                  <a:schemeClr val="tx1">
+                    <a:lumMod val="75000"/>
+                    <a:lumOff val="25000"/>
+                  </a:schemeClr>
+                </a:solidFill>
+                <a:latin typeface="+mn-lt"/>
+                <a:ea typeface="+mn-ea"/>
+                <a:cs typeface="+mn-cs"/>
+              </a:defRPr>
+            </a:lvl4pPr>
+            <a:lvl5pPr marL="2057400" indent="-228600" algn="l" defTabSz="457200" rtl="0" eaLnBrk="1" latinLnBrk="0" hangingPunct="1">
+              <a:spcBef>
+                <a:spcPts val="1000"/>
+              </a:spcBef>
+              <a:spcAft>
+                <a:spcPts val="0"/>
+              </a:spcAft>
+              <a:buClr>
+                <a:schemeClr val="accent1"/>
+              </a:buClr>
+              <a:buFont typeface="Wingdings 3" charset="2"/>
+              <a:buChar char=""/>
+              <a:defRPr sz="1200" kern="1200">
+                <a:solidFill>
+                  <a:schemeClr val="tx1">
+                    <a:lumMod val="75000"/>
+                    <a:lumOff val="25000"/>
+                  </a:schemeClr>
+                </a:solidFill>
+                <a:latin typeface="+mn-lt"/>
+                <a:ea typeface="+mn-ea"/>
+                <a:cs typeface="+mn-cs"/>
+              </a:defRPr>
+            </a:lvl5pPr>
+            <a:lvl6pPr marL="2514600" indent="-228600" algn="l" defTabSz="457200" rtl="0" eaLnBrk="1" latinLnBrk="0" hangingPunct="1">
+              <a:spcBef>
+                <a:spcPts val="1000"/>
+              </a:spcBef>
+              <a:spcAft>
+                <a:spcPts val="0"/>
+              </a:spcAft>
+              <a:buClr>
+                <a:schemeClr val="accent1"/>
+              </a:buClr>
+              <a:buFont typeface="Wingdings 3" charset="2"/>
+              <a:buChar char=""/>
+              <a:defRPr sz="1200" kern="1200">
+                <a:solidFill>
+                  <a:schemeClr val="tx1">
+                    <a:lumMod val="75000"/>
+                    <a:lumOff val="25000"/>
+                  </a:schemeClr>
+                </a:solidFill>
+                <a:latin typeface="+mn-lt"/>
+                <a:ea typeface="+mn-ea"/>
+                <a:cs typeface="+mn-cs"/>
+              </a:defRPr>
+            </a:lvl6pPr>
+            <a:lvl7pPr marL="2971800" indent="-228600" algn="l" defTabSz="457200" rtl="0" eaLnBrk="1" latinLnBrk="0" hangingPunct="1">
+              <a:spcBef>
+                <a:spcPts val="1000"/>
+              </a:spcBef>
+              <a:spcAft>
+                <a:spcPts val="0"/>
+              </a:spcAft>
+              <a:buClr>
+                <a:schemeClr val="accent1"/>
+              </a:buClr>
+              <a:buFont typeface="Wingdings 3" charset="2"/>
+              <a:buChar char=""/>
+              <a:defRPr sz="1200" kern="1200">
+                <a:solidFill>
+                  <a:schemeClr val="tx1">
+                    <a:lumMod val="75000"/>
+                    <a:lumOff val="25000"/>
+                  </a:schemeClr>
+                </a:solidFill>
+                <a:latin typeface="+mn-lt"/>
+                <a:ea typeface="+mn-ea"/>
+                <a:cs typeface="+mn-cs"/>
+              </a:defRPr>
+            </a:lvl7pPr>
+            <a:lvl8pPr marL="3429000" indent="-228600" algn="l" defTabSz="457200" rtl="0" eaLnBrk="1" latinLnBrk="0" hangingPunct="1">
+              <a:spcBef>
+                <a:spcPts val="1000"/>
+              </a:spcBef>
+              <a:spcAft>
+                <a:spcPts val="0"/>
+              </a:spcAft>
+              <a:buClr>
+                <a:schemeClr val="accent1"/>
+              </a:buClr>
+              <a:buFont typeface="Wingdings 3" charset="2"/>
+              <a:buChar char=""/>
+              <a:defRPr sz="1200" kern="1200">
+                <a:solidFill>
+                  <a:schemeClr val="tx1">
+                    <a:lumMod val="75000"/>
+                    <a:lumOff val="25000"/>
+                  </a:schemeClr>
+                </a:solidFill>
+                <a:latin typeface="+mn-lt"/>
+                <a:ea typeface="+mn-ea"/>
+                <a:cs typeface="+mn-cs"/>
+              </a:defRPr>
+            </a:lvl8pPr>
+            <a:lvl9pPr marL="3886200" indent="-228600" algn="l" defTabSz="457200" rtl="0" eaLnBrk="1" latinLnBrk="0" hangingPunct="1">
+              <a:spcBef>
+                <a:spcPts val="1000"/>
+              </a:spcBef>
+              <a:spcAft>
+                <a:spcPts val="0"/>
+              </a:spcAft>
+              <a:buClr>
+                <a:schemeClr val="accent1"/>
+              </a:buClr>
+              <a:buFont typeface="Wingdings 3" charset="2"/>
+              <a:buChar char=""/>
+              <a:defRPr sz="1200" kern="1200">
+                <a:solidFill>
+                  <a:schemeClr val="tx1">
+                    <a:lumMod val="75000"/>
+                    <a:lumOff val="25000"/>
+                  </a:schemeClr>
+                </a:solidFill>
+                <a:latin typeface="+mn-lt"/>
+                <a:ea typeface="+mn-ea"/>
+                <a:cs typeface="+mn-cs"/>
+              </a:defRPr>
+            </a:lvl9pPr>
+          </a:lstStyle>
+          <a:p>
+            <a:pPr algn="just"/>
+            <a:r>
+              <a:rPr lang="es-ES" i="1" dirty="0"/>
               <a:t>Orden Dórico: e</a:t>
             </a:r>
             <a:r>
@@ -10327,8 +10592,8 @@
         </p:blipFill>
         <p:spPr>
           <a:xfrm>
-            <a:off x="354012" y="2954017"/>
-            <a:ext cx="5822185" cy="1950889"/>
+            <a:off x="958192" y="3122693"/>
+            <a:ext cx="5057611" cy="1950889"/>
           </a:xfrm>
           <a:prstGeom prst="rect">
             <a:avLst/>
@@ -10459,7 +10724,7 @@
         </p:blipFill>
         <p:spPr>
           <a:xfrm>
-            <a:off x="5273815" y="1569942"/>
+            <a:off x="6534009" y="1569942"/>
             <a:ext cx="3142098" cy="2359642"/>
           </a:xfrm>
           <a:prstGeom prst="rect">
@@ -10489,7 +10754,7 @@
         </p:blipFill>
         <p:spPr>
           <a:xfrm>
-            <a:off x="467074" y="2321730"/>
+            <a:off x="2042339" y="2711663"/>
             <a:ext cx="3993352" cy="2644247"/>
           </a:xfrm>
           <a:prstGeom prst="rect">
@@ -10519,7 +10784,7 @@
         </p:blipFill>
         <p:spPr>
           <a:xfrm>
-            <a:off x="4701285" y="4030653"/>
+            <a:off x="6534009" y="4033787"/>
             <a:ext cx="3170430" cy="2568048"/>
           </a:xfrm>
           <a:prstGeom prst="rect">

</xml_diff>